<commit_message>
Adding img folder with images for powerpoint and powerpoint update
</commit_message>
<xml_diff>
--- a/Intro to Rmarkdown.pptx
+++ b/Intro to Rmarkdown.pptx
@@ -5,7 +5,7 @@
     <p:sldMasterId id="2147483837" r:id="rId1"/>
   </p:sldMasterIdLst>
   <p:notesMasterIdLst>
-    <p:notesMasterId r:id="rId14"/>
+    <p:notesMasterId r:id="rId17"/>
   </p:notesMasterIdLst>
   <p:sldIdLst>
     <p:sldId id="256" r:id="rId2"/>
@@ -13,13 +13,16 @@
     <p:sldId id="258" r:id="rId4"/>
     <p:sldId id="259" r:id="rId5"/>
     <p:sldId id="266" r:id="rId6"/>
-    <p:sldId id="260" r:id="rId7"/>
-    <p:sldId id="261" r:id="rId8"/>
-    <p:sldId id="262" r:id="rId9"/>
-    <p:sldId id="263" r:id="rId10"/>
-    <p:sldId id="264" r:id="rId11"/>
-    <p:sldId id="265" r:id="rId12"/>
-    <p:sldId id="267" r:id="rId13"/>
+    <p:sldId id="270" r:id="rId7"/>
+    <p:sldId id="269" r:id="rId8"/>
+    <p:sldId id="260" r:id="rId9"/>
+    <p:sldId id="261" r:id="rId10"/>
+    <p:sldId id="262" r:id="rId11"/>
+    <p:sldId id="263" r:id="rId12"/>
+    <p:sldId id="271" r:id="rId13"/>
+    <p:sldId id="264" r:id="rId14"/>
+    <p:sldId id="265" r:id="rId15"/>
+    <p:sldId id="267" r:id="rId16"/>
   </p:sldIdLst>
   <p:sldSz cx="12192000" cy="6858000"/>
   <p:notesSz cx="6858000" cy="9144000"/>
@@ -118,6 +121,11 @@
       </a:defRPr>
     </a:lvl9pPr>
   </p:defaultTextStyle>
+  <p:extLst>
+    <p:ext uri="{EFAFB233-063F-42B5-8137-9DF3F51BA10A}">
+      <p15:sldGuideLst xmlns:p15="http://schemas.microsoft.com/office/powerpoint/2012/main"/>
+    </p:ext>
+  </p:extLst>
 </p:presentation>
 </file>
 
@@ -215,7 +223,7 @@
           <a:p>
             <a:fld id="{A41849DC-AC60-481E-BFDC-BDEDD0E16138}" type="datetimeFigureOut">
               <a:rPr lang="en-GB" smtClean="0"/>
-              <a:t>31/10/2021</a:t>
+              <a:t>02/11/2021</a:t>
             </a:fld>
             <a:endParaRPr lang="en-GB"/>
           </a:p>
@@ -578,7 +586,7 @@
           <a:effectLst/>
           <a:extLst>
             <a:ext uri="{91240B29-F687-4f45-9708-019B960494DF}">
-              <a14:hiddenLine xmlns:a14="http://schemas.microsoft.com/office/drawing/2010/main" xmlns="" w="9525">
+              <a14:hiddenLine xmlns="" xmlns:a14="http://schemas.microsoft.com/office/drawing/2010/main" w="9525">
                 <a:solidFill>
                   <a:srgbClr val="000000"/>
                 </a:solidFill>
@@ -770,7 +778,7 @@
           <a:p>
             <a:fld id="{74F422FF-3907-40F3-B2E6-7D94D7224602}" type="datetimeFigureOut">
               <a:rPr lang="en-GB" smtClean="0"/>
-              <a:t>30/10/2021</a:t>
+              <a:t>02/11/2021</a:t>
             </a:fld>
             <a:endParaRPr lang="en-GB"/>
           </a:p>
@@ -1088,7 +1096,7 @@
           <a:p>
             <a:fld id="{74F422FF-3907-40F3-B2E6-7D94D7224602}" type="datetimeFigureOut">
               <a:rPr lang="en-GB" smtClean="0"/>
-              <a:t>30/10/2021</a:t>
+              <a:t>02/11/2021</a:t>
             </a:fld>
             <a:endParaRPr lang="en-GB"/>
           </a:p>
@@ -1576,7 +1584,7 @@
           <a:p>
             <a:fld id="{74F422FF-3907-40F3-B2E6-7D94D7224602}" type="datetimeFigureOut">
               <a:rPr lang="en-GB" smtClean="0"/>
-              <a:t>30/10/2021</a:t>
+              <a:t>02/11/2021</a:t>
             </a:fld>
             <a:endParaRPr lang="en-GB"/>
           </a:p>
@@ -1945,7 +1953,7 @@
           <a:p>
             <a:fld id="{74F422FF-3907-40F3-B2E6-7D94D7224602}" type="datetimeFigureOut">
               <a:rPr lang="en-GB" smtClean="0"/>
-              <a:t>30/10/2021</a:t>
+              <a:t>02/11/2021</a:t>
             </a:fld>
             <a:endParaRPr lang="en-GB"/>
           </a:p>
@@ -2100,7 +2108,7 @@
           <a:ln/>
           <a:extLst>
             <a:ext uri="{91240B29-F687-4f45-9708-019B960494DF}">
-              <a14:hiddenLine xmlns:a14="http://schemas.microsoft.com/office/drawing/2010/main" xmlns="" w="9525">
+              <a14:hiddenLine xmlns="" xmlns:a14="http://schemas.microsoft.com/office/drawing/2010/main" w="9525">
                 <a:solidFill>
                   <a:srgbClr val="000000"/>
                 </a:solidFill>
@@ -2218,7 +2226,7 @@
           <a:p>
             <a:fld id="{74F422FF-3907-40F3-B2E6-7D94D7224602}" type="datetimeFigureOut">
               <a:rPr lang="en-GB" smtClean="0"/>
-              <a:t>30/10/2021</a:t>
+              <a:t>02/11/2021</a:t>
             </a:fld>
             <a:endParaRPr lang="en-GB"/>
           </a:p>
@@ -2375,7 +2383,7 @@
           <a:ln/>
           <a:extLst>
             <a:ext uri="{91240B29-F687-4f45-9708-019B960494DF}">
-              <a14:hiddenLine xmlns:a14="http://schemas.microsoft.com/office/drawing/2010/main" xmlns="" w="9525">
+              <a14:hiddenLine xmlns="" xmlns:a14="http://schemas.microsoft.com/office/drawing/2010/main" w="9525">
                 <a:solidFill>
                   <a:srgbClr val="000000"/>
                 </a:solidFill>
@@ -2503,7 +2511,7 @@
           <a:p>
             <a:fld id="{74F422FF-3907-40F3-B2E6-7D94D7224602}" type="datetimeFigureOut">
               <a:rPr lang="en-GB" smtClean="0"/>
-              <a:t>30/10/2021</a:t>
+              <a:t>02/11/2021</a:t>
             </a:fld>
             <a:endParaRPr lang="en-GB"/>
           </a:p>
@@ -2658,7 +2666,7 @@
           <a:ln/>
           <a:extLst>
             <a:ext uri="{91240B29-F687-4f45-9708-019B960494DF}">
-              <a14:hiddenLine xmlns:a14="http://schemas.microsoft.com/office/drawing/2010/main" xmlns="" w="9525">
+              <a14:hiddenLine xmlns="" xmlns:a14="http://schemas.microsoft.com/office/drawing/2010/main" w="9525">
                 <a:solidFill>
                   <a:srgbClr val="000000"/>
                 </a:solidFill>
@@ -2786,7 +2794,7 @@
           <a:p>
             <a:fld id="{74F422FF-3907-40F3-B2E6-7D94D7224602}" type="datetimeFigureOut">
               <a:rPr lang="en-GB" smtClean="0"/>
-              <a:t>30/10/2021</a:t>
+              <a:t>02/11/2021</a:t>
             </a:fld>
             <a:endParaRPr lang="en-GB"/>
           </a:p>
@@ -3129,7 +3137,7 @@
           <a:p>
             <a:fld id="{74F422FF-3907-40F3-B2E6-7D94D7224602}" type="datetimeFigureOut">
               <a:rPr lang="en-GB" smtClean="0"/>
-              <a:t>30/10/2021</a:t>
+              <a:t>02/11/2021</a:t>
             </a:fld>
             <a:endParaRPr lang="en-GB"/>
           </a:p>
@@ -3284,7 +3292,7 @@
           <a:ln/>
           <a:extLst>
             <a:ext uri="{91240B29-F687-4f45-9708-019B960494DF}">
-              <a14:hiddenLine xmlns:a14="http://schemas.microsoft.com/office/drawing/2010/main" xmlns="" w="9525">
+              <a14:hiddenLine xmlns="" xmlns:a14="http://schemas.microsoft.com/office/drawing/2010/main" w="9525">
                 <a:solidFill>
                   <a:srgbClr val="000000"/>
                 </a:solidFill>
@@ -3468,7 +3476,7 @@
           <a:p>
             <a:fld id="{74F422FF-3907-40F3-B2E6-7D94D7224602}" type="datetimeFigureOut">
               <a:rPr lang="en-GB" smtClean="0"/>
-              <a:t>30/10/2021</a:t>
+              <a:t>02/11/2021</a:t>
             </a:fld>
             <a:endParaRPr lang="en-GB"/>
           </a:p>
@@ -3623,7 +3631,7 @@
           <a:ln/>
           <a:extLst>
             <a:ext uri="{91240B29-F687-4f45-9708-019B960494DF}">
-              <a14:hiddenLine xmlns:a14="http://schemas.microsoft.com/office/drawing/2010/main" xmlns="" w="9525">
+              <a14:hiddenLine xmlns="" xmlns:a14="http://schemas.microsoft.com/office/drawing/2010/main" w="9525">
                 <a:solidFill>
                   <a:srgbClr val="000000"/>
                 </a:solidFill>
@@ -3945,7 +3953,7 @@
           <a:p>
             <a:fld id="{74F422FF-3907-40F3-B2E6-7D94D7224602}" type="datetimeFigureOut">
               <a:rPr lang="en-GB" smtClean="0"/>
-              <a:t>30/10/2021</a:t>
+              <a:t>02/11/2021</a:t>
             </a:fld>
             <a:endParaRPr lang="en-GB"/>
           </a:p>
@@ -4100,7 +4108,7 @@
           <a:ln/>
           <a:extLst>
             <a:ext uri="{91240B29-F687-4f45-9708-019B960494DF}">
-              <a14:hiddenLine xmlns:a14="http://schemas.microsoft.com/office/drawing/2010/main" xmlns="" w="9525">
+              <a14:hiddenLine xmlns="" xmlns:a14="http://schemas.microsoft.com/office/drawing/2010/main" w="9525">
                 <a:solidFill>
                   <a:srgbClr val="000000"/>
                 </a:solidFill>
@@ -4166,7 +4174,7 @@
           <a:p>
             <a:fld id="{74F422FF-3907-40F3-B2E6-7D94D7224602}" type="datetimeFigureOut">
               <a:rPr lang="en-GB" smtClean="0"/>
-              <a:t>30/10/2021</a:t>
+              <a:t>02/11/2021</a:t>
             </a:fld>
             <a:endParaRPr lang="en-GB"/>
           </a:p>
@@ -4261,7 +4269,7 @@
           <a:p>
             <a:fld id="{74F422FF-3907-40F3-B2E6-7D94D7224602}" type="datetimeFigureOut">
               <a:rPr lang="en-GB" smtClean="0"/>
-              <a:t>30/10/2021</a:t>
+              <a:t>02/11/2021</a:t>
             </a:fld>
             <a:endParaRPr lang="en-GB"/>
           </a:p>
@@ -4529,7 +4537,7 @@
           <a:ln/>
           <a:extLst>
             <a:ext uri="{91240B29-F687-4f45-9708-019B960494DF}">
-              <a14:hiddenLine xmlns:a14="http://schemas.microsoft.com/office/drawing/2010/main" xmlns="" w="9525">
+              <a14:hiddenLine xmlns="" xmlns:a14="http://schemas.microsoft.com/office/drawing/2010/main" w="9525">
                 <a:solidFill>
                   <a:srgbClr val="000000"/>
                 </a:solidFill>
@@ -4728,7 +4736,7 @@
           <a:p>
             <a:fld id="{74F422FF-3907-40F3-B2E6-7D94D7224602}" type="datetimeFigureOut">
               <a:rPr lang="en-GB" smtClean="0"/>
-              <a:t>30/10/2021</a:t>
+              <a:t>02/11/2021</a:t>
             </a:fld>
             <a:endParaRPr lang="en-GB"/>
           </a:p>
@@ -5041,7 +5049,7 @@
           <a:p>
             <a:fld id="{74F422FF-3907-40F3-B2E6-7D94D7224602}" type="datetimeFigureOut">
               <a:rPr lang="en-GB" smtClean="0"/>
-              <a:t>30/10/2021</a:t>
+              <a:t>02/11/2021</a:t>
             </a:fld>
             <a:endParaRPr lang="en-GB"/>
           </a:p>
@@ -5311,7 +5319,7 @@
           <a:p>
             <a:fld id="{74F422FF-3907-40F3-B2E6-7D94D7224602}" type="datetimeFigureOut">
               <a:rPr lang="en-GB" smtClean="0"/>
-              <a:t>30/10/2021</a:t>
+              <a:t>02/11/2021</a:t>
             </a:fld>
             <a:endParaRPr lang="en-GB"/>
           </a:p>
@@ -5770,7 +5778,7 @@
           <p:cNvPr id="2" name="Title 1">
             <a:extLst>
               <a:ext uri="{FF2B5EF4-FFF2-40B4-BE49-F238E27FC236}">
-                <a16:creationId xmlns:a16="http://schemas.microsoft.com/office/drawing/2014/main" id="{5C5EEDBB-F5EC-40C4-921B-BDE3CDD90F83}"/>
+                <a16:creationId xmlns:a16="http://schemas.microsoft.com/office/drawing/2014/main" xmlns="" id="{5C5EEDBB-F5EC-40C4-921B-BDE3CDD90F83}"/>
               </a:ext>
             </a:extLst>
           </p:cNvPr>
@@ -5792,7 +5800,11 @@
             </a:r>
             <a:r>
               <a:rPr lang="en-US" dirty="0" err="1"/>
-              <a:t>Rmarkdown</a:t>
+              <a:t>r</a:t>
+            </a:r>
+            <a:r>
+              <a:rPr lang="en-US" dirty="0" err="1" smtClean="0"/>
+              <a:t>markdown</a:t>
             </a:r>
             <a:endParaRPr lang="en-GB" dirty="0"/>
           </a:p>
@@ -5803,7 +5815,7 @@
           <p:cNvPr id="3" name="Subtitle 2">
             <a:extLst>
               <a:ext uri="{FF2B5EF4-FFF2-40B4-BE49-F238E27FC236}">
-                <a16:creationId xmlns:a16="http://schemas.microsoft.com/office/drawing/2014/main" id="{48D483F8-83A4-49EA-B4D9-394022B2C9EA}"/>
+                <a16:creationId xmlns:a16="http://schemas.microsoft.com/office/drawing/2014/main" xmlns="" id="{48D483F8-83A4-49EA-B4D9-394022B2C9EA}"/>
               </a:ext>
             </a:extLst>
           </p:cNvPr>
@@ -5862,7 +5874,7 @@
           <p:cNvPr id="2" name="Title 1">
             <a:extLst>
               <a:ext uri="{FF2B5EF4-FFF2-40B4-BE49-F238E27FC236}">
-                <a16:creationId xmlns:a16="http://schemas.microsoft.com/office/drawing/2014/main" id="{803DFFF8-B6AC-498F-ACA6-25B7E59BD99D}"/>
+                <a16:creationId xmlns:a16="http://schemas.microsoft.com/office/drawing/2014/main" xmlns="" id="{47889A0E-484A-4318-8C14-077538768011}"/>
               </a:ext>
             </a:extLst>
           </p:cNvPr>
@@ -5879,16 +5891,8 @@
           <a:lstStyle/>
           <a:p>
             <a:r>
-              <a:rPr lang="en-US" dirty="0" err="1"/>
-              <a:t>Paramaterised</a:t>
-            </a:r>
-            <a:r>
               <a:rPr lang="en-US" dirty="0"/>
-              <a:t> </a:t>
-            </a:r>
-            <a:r>
-              <a:rPr lang="en-US" dirty="0" err="1"/>
-              <a:t>RMarkdown</a:t>
+              <a:t>Markdown Area</a:t>
             </a:r>
             <a:endParaRPr lang="en-GB" dirty="0"/>
           </a:p>
@@ -5899,7 +5903,7 @@
           <p:cNvPr id="3" name="Content Placeholder 2">
             <a:extLst>
               <a:ext uri="{FF2B5EF4-FFF2-40B4-BE49-F238E27FC236}">
-                <a16:creationId xmlns:a16="http://schemas.microsoft.com/office/drawing/2014/main" id="{875DB145-5A65-42B0-A087-1B117A4DE96D}"/>
+                <a16:creationId xmlns:a16="http://schemas.microsoft.com/office/drawing/2014/main" xmlns="" id="{18830ADE-7DB5-4DE5-BF28-EF61CAB83822}"/>
               </a:ext>
             </a:extLst>
           </p:cNvPr>
@@ -5915,20 +5919,67 @@
           <a:bodyPr/>
           <a:lstStyle/>
           <a:p>
-            <a:endParaRPr lang="en-GB" dirty="0"/>
-          </a:p>
-        </p:txBody>
-      </p:sp>
+            <a:r>
+              <a:rPr lang="en-US" dirty="0"/>
+              <a:t>The Markdown Area is used to format within the report itself.</a:t>
+            </a:r>
+          </a:p>
+          <a:p>
+            <a:pPr lvl="1"/>
+            <a:r>
+              <a:rPr lang="en-US" dirty="0"/>
+              <a:t>Examples include: Headers, Tabs, Bolds, Italics, Lists, Numbered Lists, and more….</a:t>
+            </a:r>
+          </a:p>
+        </p:txBody>
+      </p:sp>
+      <p:pic>
+        <p:nvPicPr>
+          <p:cNvPr id="4" name="Picture 3"/>
+          <p:cNvPicPr>
+            <a:picLocks noChangeAspect="1"/>
+          </p:cNvPicPr>
+          <p:nvPr/>
+        </p:nvPicPr>
+        <p:blipFill>
+          <a:blip r:embed="rId2">
+            <a:extLst>
+              <a:ext uri="{28A0092B-C50C-407E-A947-70E740481C1C}">
+                <a14:useLocalDpi xmlns:a14="http://schemas.microsoft.com/office/drawing/2010/main" val="0"/>
+              </a:ext>
+            </a:extLst>
+          </a:blip>
+          <a:stretch>
+            <a:fillRect/>
+          </a:stretch>
+        </p:blipFill>
+        <p:spPr>
+          <a:xfrm>
+            <a:off x="0" y="4893107"/>
+            <a:ext cx="12132282" cy="785636"/>
+          </a:xfrm>
+          <a:prstGeom prst="rect">
+            <a:avLst/>
+          </a:prstGeom>
+        </p:spPr>
+      </p:pic>
     </p:spTree>
     <p:extLst>
       <p:ext uri="{BB962C8B-B14F-4D97-AF65-F5344CB8AC3E}">
-        <p14:creationId xmlns:p14="http://schemas.microsoft.com/office/powerpoint/2010/main" val="726573451"/>
+        <p14:creationId xmlns:p14="http://schemas.microsoft.com/office/powerpoint/2010/main" val="3299984132"/>
       </p:ext>
     </p:extLst>
   </p:cSld>
   <p:clrMapOvr>
     <a:masterClrMapping/>
   </p:clrMapOvr>
+  <p:timing>
+    <p:tnLst>
+      <p:par>
+        <p:cTn id="1" dur="indefinite" restart="never" nodeType="tmRoot"/>
+      </p:par>
+    </p:tnLst>
+  </p:timing>
 </p:sld>
 </file>
 
@@ -5954,7 +6005,7 @@
           <p:cNvPr id="2" name="Title 1">
             <a:extLst>
               <a:ext uri="{FF2B5EF4-FFF2-40B4-BE49-F238E27FC236}">
-                <a16:creationId xmlns:a16="http://schemas.microsoft.com/office/drawing/2014/main" id="{24B0D75E-47A9-4006-856F-1796279C28A1}"/>
+                <a16:creationId xmlns:a16="http://schemas.microsoft.com/office/drawing/2014/main" xmlns="" id="{D0A6DE59-9408-4F11-912A-3DD00F5D7FDB}"/>
               </a:ext>
             </a:extLst>
           </p:cNvPr>
@@ -5972,15 +6023,7 @@
           <a:p>
             <a:r>
               <a:rPr lang="en-US" dirty="0"/>
-              <a:t>Functions for </a:t>
-            </a:r>
-            <a:r>
-              <a:rPr lang="en-US" dirty="0" err="1"/>
-              <a:t>Rmarkdown</a:t>
-            </a:r>
-            <a:r>
-              <a:rPr lang="en-US" dirty="0"/>
-              <a:t> Automation</a:t>
+              <a:t>Code Area</a:t>
             </a:r>
             <a:endParaRPr lang="en-GB" dirty="0"/>
           </a:p>
@@ -5991,7 +6034,7 @@
           <p:cNvPr id="3" name="Content Placeholder 2">
             <a:extLst>
               <a:ext uri="{FF2B5EF4-FFF2-40B4-BE49-F238E27FC236}">
-                <a16:creationId xmlns:a16="http://schemas.microsoft.com/office/drawing/2014/main" id="{88737558-6FD9-4E18-8785-608C60B072A3}"/>
+                <a16:creationId xmlns:a16="http://schemas.microsoft.com/office/drawing/2014/main" xmlns="" id="{CA71E659-FCAD-433B-906F-740C5E3CACC0}"/>
               </a:ext>
             </a:extLst>
           </p:cNvPr>
@@ -5999,7 +6042,7 @@
             <a:spLocks noGrp="1"/>
           </p:cNvSpPr>
           <p:nvPr>
-            <p:ph idx="1"/>
+            <p:ph sz="half" idx="1"/>
           </p:nvPr>
         </p:nvSpPr>
         <p:spPr/>
@@ -6009,30 +6052,84 @@
           <a:p>
             <a:r>
               <a:rPr lang="en-US" dirty="0"/>
-              <a:t>Since </a:t>
+              <a:t>The Coding Area is used as a space to develop code for the </a:t>
+            </a:r>
+            <a:r>
+              <a:rPr lang="en-US" dirty="0" err="1" smtClean="0"/>
+              <a:t>rmarkdown</a:t>
+            </a:r>
+            <a:r>
+              <a:rPr lang="en-US" dirty="0" smtClean="0"/>
+              <a:t> </a:t>
+            </a:r>
+            <a:r>
+              <a:rPr lang="en-US" dirty="0"/>
+              <a:t>report.</a:t>
+            </a:r>
+          </a:p>
+          <a:p>
+            <a:r>
+              <a:rPr lang="en-US" dirty="0"/>
+              <a:t>The majority of times the final output of these code chunks will be some type of </a:t>
             </a:r>
             <a:r>
               <a:rPr lang="en-US" dirty="0" err="1"/>
-              <a:t>Rmarkdown</a:t>
+              <a:t>visualisation</a:t>
             </a:r>
             <a:r>
               <a:rPr lang="en-US" dirty="0"/>
-              <a:t> itself is a package there are some functions that can be used to generate reports on the fly.</a:t>
+              <a:t> (graph, table, etc.)</a:t>
             </a:r>
             <a:endParaRPr lang="en-GB" dirty="0"/>
           </a:p>
         </p:txBody>
       </p:sp>
+      <p:pic>
+        <p:nvPicPr>
+          <p:cNvPr id="5" name="Content Placeholder 4"/>
+          <p:cNvPicPr>
+            <a:picLocks noGrp="1" noChangeAspect="1"/>
+          </p:cNvPicPr>
+          <p:nvPr>
+            <p:ph sz="half" idx="2"/>
+          </p:nvPr>
+        </p:nvPicPr>
+        <p:blipFill>
+          <a:blip r:embed="rId2">
+            <a:extLst>
+              <a:ext uri="{28A0092B-C50C-407E-A947-70E740481C1C}">
+                <a14:useLocalDpi xmlns:a14="http://schemas.microsoft.com/office/drawing/2010/main" val="0"/>
+              </a:ext>
+            </a:extLst>
+          </a:blip>
+          <a:stretch>
+            <a:fillRect/>
+          </a:stretch>
+        </p:blipFill>
+        <p:spPr>
+          <a:xfrm>
+            <a:off x="7334267" y="3278660"/>
+            <a:ext cx="3183774" cy="1469435"/>
+          </a:xfrm>
+        </p:spPr>
+      </p:pic>
     </p:spTree>
     <p:extLst>
       <p:ext uri="{BB962C8B-B14F-4D97-AF65-F5344CB8AC3E}">
-        <p14:creationId xmlns:p14="http://schemas.microsoft.com/office/powerpoint/2010/main" val="2909781423"/>
+        <p14:creationId xmlns:p14="http://schemas.microsoft.com/office/powerpoint/2010/main" val="3800950481"/>
       </p:ext>
     </p:extLst>
   </p:cSld>
   <p:clrMapOvr>
     <a:masterClrMapping/>
   </p:clrMapOvr>
+  <p:timing>
+    <p:tnLst>
+      <p:par>
+        <p:cTn id="1" dur="indefinite" restart="never" nodeType="tmRoot"/>
+      </p:par>
+    </p:tnLst>
+  </p:timing>
 </p:sld>
 </file>
 
@@ -6055,10 +6152,86 @@
       </p:grpSpPr>
       <p:sp>
         <p:nvSpPr>
+          <p:cNvPr id="2" name="Title 1"/>
+          <p:cNvSpPr>
+            <a:spLocks noGrp="1"/>
+          </p:cNvSpPr>
+          <p:nvPr>
+            <p:ph type="ctrTitle"/>
+          </p:nvPr>
+        </p:nvSpPr>
+        <p:spPr/>
+        <p:txBody>
+          <a:bodyPr/>
+          <a:lstStyle/>
+          <a:p>
+            <a:r>
+              <a:rPr lang="en-GB" dirty="0" smtClean="0"/>
+              <a:t>SHOWCASE</a:t>
+            </a:r>
+            <a:endParaRPr lang="en-GB" dirty="0"/>
+          </a:p>
+        </p:txBody>
+      </p:sp>
+      <p:sp>
+        <p:nvSpPr>
+          <p:cNvPr id="3" name="Subtitle 2"/>
+          <p:cNvSpPr>
+            <a:spLocks noGrp="1"/>
+          </p:cNvSpPr>
+          <p:nvPr>
+            <p:ph type="subTitle" idx="1"/>
+          </p:nvPr>
+        </p:nvSpPr>
+        <p:spPr/>
+        <p:txBody>
+          <a:bodyPr/>
+          <a:lstStyle/>
+          <a:p>
+            <a:r>
+              <a:rPr lang="en-GB" dirty="0" smtClean="0"/>
+              <a:t>Let’s See Your Efforts!</a:t>
+            </a:r>
+            <a:endParaRPr lang="en-GB" dirty="0"/>
+          </a:p>
+        </p:txBody>
+      </p:sp>
+    </p:spTree>
+    <p:extLst>
+      <p:ext uri="{BB962C8B-B14F-4D97-AF65-F5344CB8AC3E}">
+        <p14:creationId xmlns:p14="http://schemas.microsoft.com/office/powerpoint/2010/main" val="3912006378"/>
+      </p:ext>
+    </p:extLst>
+  </p:cSld>
+  <p:clrMapOvr>
+    <a:masterClrMapping/>
+  </p:clrMapOvr>
+</p:sld>
+</file>
+
+<file path=ppt/slides/slide13.xml><?xml version="1.0" encoding="utf-8"?>
+<p:sld xmlns:a="http://schemas.openxmlformats.org/drawingml/2006/main" xmlns:r="http://schemas.openxmlformats.org/officeDocument/2006/relationships" xmlns:p="http://schemas.openxmlformats.org/presentationml/2006/main">
+  <p:cSld>
+    <p:spTree>
+      <p:nvGrpSpPr>
+        <p:cNvPr id="1" name=""/>
+        <p:cNvGrpSpPr/>
+        <p:nvPr/>
+      </p:nvGrpSpPr>
+      <p:grpSpPr>
+        <a:xfrm>
+          <a:off x="0" y="0"/>
+          <a:ext cx="0" cy="0"/>
+          <a:chOff x="0" y="0"/>
+          <a:chExt cx="0" cy="0"/>
+        </a:xfrm>
+      </p:grpSpPr>
+      <p:sp>
+        <p:nvSpPr>
           <p:cNvPr id="2" name="Title 1">
             <a:extLst>
               <a:ext uri="{FF2B5EF4-FFF2-40B4-BE49-F238E27FC236}">
-                <a16:creationId xmlns:a16="http://schemas.microsoft.com/office/drawing/2014/main" id="{C82F3B74-90EE-40C9-A0AE-6341F0A75B43}"/>
+                <a16:creationId xmlns:a16="http://schemas.microsoft.com/office/drawing/2014/main" xmlns="" id="{803DFFF8-B6AC-498F-ACA6-25B7E59BD99D}"/>
               </a:ext>
             </a:extLst>
           </p:cNvPr>
@@ -6075,8 +6248,24 @@
           <a:lstStyle/>
           <a:p>
             <a:r>
+              <a:rPr lang="en-US" dirty="0" err="1"/>
+              <a:t>Paramaterised</a:t>
+            </a:r>
+            <a:r>
               <a:rPr lang="en-US" dirty="0"/>
-              <a:t>Demo</a:t>
+              <a:t> </a:t>
+            </a:r>
+            <a:r>
+              <a:rPr lang="en-US" dirty="0" err="1" smtClean="0"/>
+              <a:t>r</a:t>
+            </a:r>
+            <a:r>
+              <a:rPr lang="en-US" dirty="0" err="1"/>
+              <a:t>m</a:t>
+            </a:r>
+            <a:r>
+              <a:rPr lang="en-US" dirty="0" err="1" smtClean="0"/>
+              <a:t>arkdown</a:t>
             </a:r>
             <a:endParaRPr lang="en-GB" dirty="0"/>
           </a:p>
@@ -6087,7 +6276,7 @@
           <p:cNvPr id="3" name="Content Placeholder 2">
             <a:extLst>
               <a:ext uri="{FF2B5EF4-FFF2-40B4-BE49-F238E27FC236}">
-                <a16:creationId xmlns:a16="http://schemas.microsoft.com/office/drawing/2014/main" id="{D3A11F84-BA84-4EE4-B76A-06C91354F4D1}"/>
+                <a16:creationId xmlns:a16="http://schemas.microsoft.com/office/drawing/2014/main" xmlns="" id="{875DB145-5A65-42B0-A087-1B117A4DE96D}"/>
               </a:ext>
             </a:extLst>
           </p:cNvPr>
@@ -6095,6 +6284,291 @@
             <a:spLocks noGrp="1"/>
           </p:cNvSpPr>
           <p:nvPr>
+            <p:ph sz="half" idx="1"/>
+          </p:nvPr>
+        </p:nvSpPr>
+        <p:spPr/>
+        <p:txBody>
+          <a:bodyPr/>
+          <a:lstStyle/>
+          <a:p>
+            <a:r>
+              <a:rPr lang="en-GB" dirty="0" smtClean="0"/>
+              <a:t>Parameterised reports allow you to creat</a:t>
+            </a:r>
+            <a:r>
+              <a:rPr lang="en-GB" dirty="0" smtClean="0"/>
+              <a:t>e multiple reports with different inputs (like working with functions)</a:t>
+            </a:r>
+          </a:p>
+          <a:p>
+            <a:pPr lvl="1"/>
+            <a:r>
+              <a:rPr lang="en-GB" dirty="0" smtClean="0"/>
+              <a:t>The input parameter will take the location of every named parameter space</a:t>
+            </a:r>
+            <a:endParaRPr lang="en-GB" dirty="0"/>
+          </a:p>
+        </p:txBody>
+      </p:sp>
+      <p:pic>
+        <p:nvPicPr>
+          <p:cNvPr id="9" name="Picture 8"/>
+          <p:cNvPicPr>
+            <a:picLocks noChangeAspect="1"/>
+          </p:cNvPicPr>
+          <p:nvPr/>
+        </p:nvPicPr>
+        <p:blipFill>
+          <a:blip r:embed="rId2">
+            <a:extLst>
+              <a:ext uri="{28A0092B-C50C-407E-A947-70E740481C1C}">
+                <a14:useLocalDpi xmlns:a14="http://schemas.microsoft.com/office/drawing/2010/main" val="0"/>
+              </a:ext>
+            </a:extLst>
+          </a:blip>
+          <a:stretch>
+            <a:fillRect/>
+          </a:stretch>
+        </p:blipFill>
+        <p:spPr>
+          <a:xfrm>
+            <a:off x="6004585" y="2319325"/>
+            <a:ext cx="3400900" cy="857370"/>
+          </a:xfrm>
+          <a:prstGeom prst="rect">
+            <a:avLst/>
+          </a:prstGeom>
+        </p:spPr>
+      </p:pic>
+      <p:pic>
+        <p:nvPicPr>
+          <p:cNvPr id="8" name="Content Placeholder 7"/>
+          <p:cNvPicPr>
+            <a:picLocks noGrp="1" noChangeAspect="1"/>
+          </p:cNvPicPr>
+          <p:nvPr>
+            <p:ph sz="half" idx="2"/>
+          </p:nvPr>
+        </p:nvPicPr>
+        <p:blipFill>
+          <a:blip r:embed="rId3">
+            <a:extLst>
+              <a:ext uri="{28A0092B-C50C-407E-A947-70E740481C1C}">
+                <a14:useLocalDpi xmlns:a14="http://schemas.microsoft.com/office/drawing/2010/main" val="0"/>
+              </a:ext>
+            </a:extLst>
+          </a:blip>
+          <a:stretch>
+            <a:fillRect/>
+          </a:stretch>
+        </p:blipFill>
+        <p:spPr>
+          <a:xfrm>
+            <a:off x="7979320" y="2809102"/>
+            <a:ext cx="3402678" cy="3571461"/>
+          </a:xfrm>
+        </p:spPr>
+      </p:pic>
+    </p:spTree>
+    <p:extLst>
+      <p:ext uri="{BB962C8B-B14F-4D97-AF65-F5344CB8AC3E}">
+        <p14:creationId xmlns:p14="http://schemas.microsoft.com/office/powerpoint/2010/main" val="726573451"/>
+      </p:ext>
+    </p:extLst>
+  </p:cSld>
+  <p:clrMapOvr>
+    <a:masterClrMapping/>
+  </p:clrMapOvr>
+  <p:timing>
+    <p:tnLst>
+      <p:par>
+        <p:cTn id="1" dur="indefinite" restart="never" nodeType="tmRoot"/>
+      </p:par>
+    </p:tnLst>
+  </p:timing>
+</p:sld>
+</file>
+
+<file path=ppt/slides/slide14.xml><?xml version="1.0" encoding="utf-8"?>
+<p:sld xmlns:a="http://schemas.openxmlformats.org/drawingml/2006/main" xmlns:r="http://schemas.openxmlformats.org/officeDocument/2006/relationships" xmlns:p="http://schemas.openxmlformats.org/presentationml/2006/main">
+  <p:cSld>
+    <p:spTree>
+      <p:nvGrpSpPr>
+        <p:cNvPr id="1" name=""/>
+        <p:cNvGrpSpPr/>
+        <p:nvPr/>
+      </p:nvGrpSpPr>
+      <p:grpSpPr>
+        <a:xfrm>
+          <a:off x="0" y="0"/>
+          <a:ext cx="0" cy="0"/>
+          <a:chOff x="0" y="0"/>
+          <a:chExt cx="0" cy="0"/>
+        </a:xfrm>
+      </p:grpSpPr>
+      <p:sp>
+        <p:nvSpPr>
+          <p:cNvPr id="2" name="Title 1">
+            <a:extLst>
+              <a:ext uri="{FF2B5EF4-FFF2-40B4-BE49-F238E27FC236}">
+                <a16:creationId xmlns:a16="http://schemas.microsoft.com/office/drawing/2014/main" xmlns="" id="{24B0D75E-47A9-4006-856F-1796279C28A1}"/>
+              </a:ext>
+            </a:extLst>
+          </p:cNvPr>
+          <p:cNvSpPr>
+            <a:spLocks noGrp="1"/>
+          </p:cNvSpPr>
+          <p:nvPr>
+            <p:ph type="title"/>
+          </p:nvPr>
+        </p:nvSpPr>
+        <p:spPr/>
+        <p:txBody>
+          <a:bodyPr/>
+          <a:lstStyle/>
+          <a:p>
+            <a:r>
+              <a:rPr lang="en-US" dirty="0"/>
+              <a:t>Functions for </a:t>
+            </a:r>
+            <a:r>
+              <a:rPr lang="en-US" dirty="0" err="1"/>
+              <a:t>r</a:t>
+            </a:r>
+            <a:r>
+              <a:rPr lang="en-US" dirty="0" err="1" smtClean="0"/>
+              <a:t>markdown</a:t>
+            </a:r>
+            <a:r>
+              <a:rPr lang="en-US" dirty="0" smtClean="0"/>
+              <a:t> </a:t>
+            </a:r>
+            <a:r>
+              <a:rPr lang="en-US" dirty="0"/>
+              <a:t>Automation</a:t>
+            </a:r>
+            <a:endParaRPr lang="en-GB" dirty="0"/>
+          </a:p>
+        </p:txBody>
+      </p:sp>
+      <p:sp>
+        <p:nvSpPr>
+          <p:cNvPr id="3" name="Content Placeholder 2">
+            <a:extLst>
+              <a:ext uri="{FF2B5EF4-FFF2-40B4-BE49-F238E27FC236}">
+                <a16:creationId xmlns:a16="http://schemas.microsoft.com/office/drawing/2014/main" xmlns="" id="{88737558-6FD9-4E18-8785-608C60B072A3}"/>
+              </a:ext>
+            </a:extLst>
+          </p:cNvPr>
+          <p:cNvSpPr>
+            <a:spLocks noGrp="1"/>
+          </p:cNvSpPr>
+          <p:nvPr>
+            <p:ph idx="1"/>
+          </p:nvPr>
+        </p:nvSpPr>
+        <p:spPr/>
+        <p:txBody>
+          <a:bodyPr/>
+          <a:lstStyle/>
+          <a:p>
+            <a:r>
+              <a:rPr lang="en-US" dirty="0"/>
+              <a:t>Since </a:t>
+            </a:r>
+            <a:r>
+              <a:rPr lang="en-US" dirty="0" err="1"/>
+              <a:t>r</a:t>
+            </a:r>
+            <a:r>
+              <a:rPr lang="en-US" dirty="0" err="1" smtClean="0"/>
+              <a:t>markdown</a:t>
+            </a:r>
+            <a:r>
+              <a:rPr lang="en-US" dirty="0" smtClean="0"/>
+              <a:t> </a:t>
+            </a:r>
+            <a:r>
+              <a:rPr lang="en-US" dirty="0"/>
+              <a:t>itself is a package there are some functions that can be used to generate reports on the fly.</a:t>
+            </a:r>
+            <a:endParaRPr lang="en-GB" dirty="0"/>
+          </a:p>
+        </p:txBody>
+      </p:sp>
+    </p:spTree>
+    <p:extLst>
+      <p:ext uri="{BB962C8B-B14F-4D97-AF65-F5344CB8AC3E}">
+        <p14:creationId xmlns:p14="http://schemas.microsoft.com/office/powerpoint/2010/main" val="2909781423"/>
+      </p:ext>
+    </p:extLst>
+  </p:cSld>
+  <p:clrMapOvr>
+    <a:masterClrMapping/>
+  </p:clrMapOvr>
+</p:sld>
+</file>
+
+<file path=ppt/slides/slide15.xml><?xml version="1.0" encoding="utf-8"?>
+<p:sld xmlns:a="http://schemas.openxmlformats.org/drawingml/2006/main" xmlns:r="http://schemas.openxmlformats.org/officeDocument/2006/relationships" xmlns:p="http://schemas.openxmlformats.org/presentationml/2006/main">
+  <p:cSld>
+    <p:spTree>
+      <p:nvGrpSpPr>
+        <p:cNvPr id="1" name=""/>
+        <p:cNvGrpSpPr/>
+        <p:nvPr/>
+      </p:nvGrpSpPr>
+      <p:grpSpPr>
+        <a:xfrm>
+          <a:off x="0" y="0"/>
+          <a:ext cx="0" cy="0"/>
+          <a:chOff x="0" y="0"/>
+          <a:chExt cx="0" cy="0"/>
+        </a:xfrm>
+      </p:grpSpPr>
+      <p:sp>
+        <p:nvSpPr>
+          <p:cNvPr id="2" name="Title 1">
+            <a:extLst>
+              <a:ext uri="{FF2B5EF4-FFF2-40B4-BE49-F238E27FC236}">
+                <a16:creationId xmlns:a16="http://schemas.microsoft.com/office/drawing/2014/main" xmlns="" id="{C82F3B74-90EE-40C9-A0AE-6341F0A75B43}"/>
+              </a:ext>
+            </a:extLst>
+          </p:cNvPr>
+          <p:cNvSpPr>
+            <a:spLocks noGrp="1"/>
+          </p:cNvSpPr>
+          <p:nvPr>
+            <p:ph type="title"/>
+          </p:nvPr>
+        </p:nvSpPr>
+        <p:spPr/>
+        <p:txBody>
+          <a:bodyPr/>
+          <a:lstStyle/>
+          <a:p>
+            <a:r>
+              <a:rPr lang="en-US" dirty="0"/>
+              <a:t>Demo</a:t>
+            </a:r>
+            <a:endParaRPr lang="en-GB" dirty="0"/>
+          </a:p>
+        </p:txBody>
+      </p:sp>
+      <p:sp>
+        <p:nvSpPr>
+          <p:cNvPr id="3" name="Content Placeholder 2">
+            <a:extLst>
+              <a:ext uri="{FF2B5EF4-FFF2-40B4-BE49-F238E27FC236}">
+                <a16:creationId xmlns:a16="http://schemas.microsoft.com/office/drawing/2014/main" xmlns="" id="{D3A11F84-BA84-4EE4-B76A-06C91354F4D1}"/>
+              </a:ext>
+            </a:extLst>
+          </p:cNvPr>
+          <p:cNvSpPr>
+            <a:spLocks noGrp="1"/>
+          </p:cNvSpPr>
+          <p:nvPr>
             <p:ph idx="1"/>
           </p:nvPr>
         </p:nvSpPr>
@@ -6109,7 +6583,11 @@
             </a:r>
             <a:r>
               <a:rPr lang="en-US" dirty="0" err="1"/>
-              <a:t>Rmarkdown</a:t>
+              <a:t>r</a:t>
+            </a:r>
+            <a:r>
+              <a:rPr lang="en-US" dirty="0" err="1" smtClean="0"/>
+              <a:t>markdown</a:t>
             </a:r>
             <a:r>
               <a:rPr lang="en-US" dirty="0"/>
@@ -6154,7 +6632,7 @@
           <p:cNvPr id="2" name="Arrow: Right 1">
             <a:extLst>
               <a:ext uri="{FF2B5EF4-FFF2-40B4-BE49-F238E27FC236}">
-                <a16:creationId xmlns:a16="http://schemas.microsoft.com/office/drawing/2014/main" id="{FB6262E4-5594-4D19-80C9-DF1F37EBA37E}"/>
+                <a16:creationId xmlns:a16="http://schemas.microsoft.com/office/drawing/2014/main" xmlns="" id="{FB6262E4-5594-4D19-80C9-DF1F37EBA37E}"/>
               </a:ext>
             </a:extLst>
           </p:cNvPr>
@@ -6200,7 +6678,7 @@
           <p:cNvPr id="3" name="Arrow: Right 2">
             <a:extLst>
               <a:ext uri="{FF2B5EF4-FFF2-40B4-BE49-F238E27FC236}">
-                <a16:creationId xmlns:a16="http://schemas.microsoft.com/office/drawing/2014/main" id="{6E3EE2E6-8CD4-4AC1-A196-934ACF9EF206}"/>
+                <a16:creationId xmlns:a16="http://schemas.microsoft.com/office/drawing/2014/main" xmlns="" id="{6E3EE2E6-8CD4-4AC1-A196-934ACF9EF206}"/>
               </a:ext>
             </a:extLst>
           </p:cNvPr>
@@ -6246,7 +6724,7 @@
           <p:cNvPr id="4" name="Arrow: Right 3">
             <a:extLst>
               <a:ext uri="{FF2B5EF4-FFF2-40B4-BE49-F238E27FC236}">
-                <a16:creationId xmlns:a16="http://schemas.microsoft.com/office/drawing/2014/main" id="{4A4CD125-79D2-4DF5-8711-59DD4C76F050}"/>
+                <a16:creationId xmlns:a16="http://schemas.microsoft.com/office/drawing/2014/main" xmlns="" id="{4A4CD125-79D2-4DF5-8711-59DD4C76F050}"/>
               </a:ext>
             </a:extLst>
           </p:cNvPr>
@@ -6292,7 +6770,7 @@
           <p:cNvPr id="5" name="Arrow: Right 4">
             <a:extLst>
               <a:ext uri="{FF2B5EF4-FFF2-40B4-BE49-F238E27FC236}">
-                <a16:creationId xmlns:a16="http://schemas.microsoft.com/office/drawing/2014/main" id="{F739A2BD-ECC1-4D1E-A85A-5C876EB21740}"/>
+                <a16:creationId xmlns:a16="http://schemas.microsoft.com/office/drawing/2014/main" xmlns="" id="{F739A2BD-ECC1-4D1E-A85A-5C876EB21740}"/>
               </a:ext>
             </a:extLst>
           </p:cNvPr>
@@ -6338,7 +6816,7 @@
           <p:cNvPr id="6" name="Arrow: Right 5">
             <a:extLst>
               <a:ext uri="{FF2B5EF4-FFF2-40B4-BE49-F238E27FC236}">
-                <a16:creationId xmlns:a16="http://schemas.microsoft.com/office/drawing/2014/main" id="{C2A32E66-8488-4503-A537-082B5958F4A4}"/>
+                <a16:creationId xmlns:a16="http://schemas.microsoft.com/office/drawing/2014/main" xmlns="" id="{C2A32E66-8488-4503-A537-082B5958F4A4}"/>
               </a:ext>
             </a:extLst>
           </p:cNvPr>
@@ -6384,7 +6862,7 @@
           <p:cNvPr id="7" name="Arrow: Right 6">
             <a:extLst>
               <a:ext uri="{FF2B5EF4-FFF2-40B4-BE49-F238E27FC236}">
-                <a16:creationId xmlns:a16="http://schemas.microsoft.com/office/drawing/2014/main" id="{7D088966-E675-4563-9EBF-61CE71A7886E}"/>
+                <a16:creationId xmlns:a16="http://schemas.microsoft.com/office/drawing/2014/main" xmlns="" id="{7D088966-E675-4563-9EBF-61CE71A7886E}"/>
               </a:ext>
             </a:extLst>
           </p:cNvPr>
@@ -6430,7 +6908,7 @@
           <p:cNvPr id="8" name="Arrow: Right 7">
             <a:extLst>
               <a:ext uri="{FF2B5EF4-FFF2-40B4-BE49-F238E27FC236}">
-                <a16:creationId xmlns:a16="http://schemas.microsoft.com/office/drawing/2014/main" id="{C63E3BE6-0E9F-4B02-8ACE-03F575F73B36}"/>
+                <a16:creationId xmlns:a16="http://schemas.microsoft.com/office/drawing/2014/main" xmlns="" id="{C63E3BE6-0E9F-4B02-8ACE-03F575F73B36}"/>
               </a:ext>
             </a:extLst>
           </p:cNvPr>
@@ -6476,7 +6954,7 @@
           <p:cNvPr id="9" name="Arrow: Right 8">
             <a:extLst>
               <a:ext uri="{FF2B5EF4-FFF2-40B4-BE49-F238E27FC236}">
-                <a16:creationId xmlns:a16="http://schemas.microsoft.com/office/drawing/2014/main" id="{ED5684BE-AEA1-4DA9-812F-A2D9478D6635}"/>
+                <a16:creationId xmlns:a16="http://schemas.microsoft.com/office/drawing/2014/main" xmlns="" id="{ED5684BE-AEA1-4DA9-812F-A2D9478D6635}"/>
               </a:ext>
             </a:extLst>
           </p:cNvPr>
@@ -6522,7 +7000,7 @@
           <p:cNvPr id="10" name="TextBox 9">
             <a:extLst>
               <a:ext uri="{FF2B5EF4-FFF2-40B4-BE49-F238E27FC236}">
-                <a16:creationId xmlns:a16="http://schemas.microsoft.com/office/drawing/2014/main" id="{C0AE8BC0-19EE-4191-8041-ACB214A759CC}"/>
+                <a16:creationId xmlns:a16="http://schemas.microsoft.com/office/drawing/2014/main" xmlns="" id="{C0AE8BC0-19EE-4191-8041-ACB214A759CC}"/>
               </a:ext>
             </a:extLst>
           </p:cNvPr>
@@ -6558,7 +7036,7 @@
           <p:cNvPr id="11" name="TextBox 10">
             <a:extLst>
               <a:ext uri="{FF2B5EF4-FFF2-40B4-BE49-F238E27FC236}">
-                <a16:creationId xmlns:a16="http://schemas.microsoft.com/office/drawing/2014/main" id="{61B98CCF-F1CB-459B-94A2-6E3FC3D6D86E}"/>
+                <a16:creationId xmlns:a16="http://schemas.microsoft.com/office/drawing/2014/main" xmlns="" id="{61B98CCF-F1CB-459B-94A2-6E3FC3D6D86E}"/>
               </a:ext>
             </a:extLst>
           </p:cNvPr>
@@ -6594,7 +7072,7 @@
           <p:cNvPr id="13" name="TextBox 12">
             <a:extLst>
               <a:ext uri="{FF2B5EF4-FFF2-40B4-BE49-F238E27FC236}">
-                <a16:creationId xmlns:a16="http://schemas.microsoft.com/office/drawing/2014/main" id="{F40738C9-8925-42F2-AA6F-40989454A9A0}"/>
+                <a16:creationId xmlns:a16="http://schemas.microsoft.com/office/drawing/2014/main" xmlns="" id="{F40738C9-8925-42F2-AA6F-40989454A9A0}"/>
               </a:ext>
             </a:extLst>
           </p:cNvPr>
@@ -6630,7 +7108,7 @@
           <p:cNvPr id="14" name="TextBox 13">
             <a:extLst>
               <a:ext uri="{FF2B5EF4-FFF2-40B4-BE49-F238E27FC236}">
-                <a16:creationId xmlns:a16="http://schemas.microsoft.com/office/drawing/2014/main" id="{B083AAA7-A047-477D-905A-CB9230CDB14E}"/>
+                <a16:creationId xmlns:a16="http://schemas.microsoft.com/office/drawing/2014/main" xmlns="" id="{B083AAA7-A047-477D-905A-CB9230CDB14E}"/>
               </a:ext>
             </a:extLst>
           </p:cNvPr>
@@ -6666,7 +7144,7 @@
           <p:cNvPr id="15" name="TextBox 14">
             <a:extLst>
               <a:ext uri="{FF2B5EF4-FFF2-40B4-BE49-F238E27FC236}">
-                <a16:creationId xmlns:a16="http://schemas.microsoft.com/office/drawing/2014/main" id="{506DC021-A6D0-41F5-888E-41564AF8001D}"/>
+                <a16:creationId xmlns:a16="http://schemas.microsoft.com/office/drawing/2014/main" xmlns="" id="{506DC021-A6D0-41F5-888E-41564AF8001D}"/>
               </a:ext>
             </a:extLst>
           </p:cNvPr>
@@ -6702,7 +7180,7 @@
           <p:cNvPr id="16" name="TextBox 15">
             <a:extLst>
               <a:ext uri="{FF2B5EF4-FFF2-40B4-BE49-F238E27FC236}">
-                <a16:creationId xmlns:a16="http://schemas.microsoft.com/office/drawing/2014/main" id="{0A3AED55-BA85-4974-A6F2-6BB0DDD8D240}"/>
+                <a16:creationId xmlns:a16="http://schemas.microsoft.com/office/drawing/2014/main" xmlns="" id="{0A3AED55-BA85-4974-A6F2-6BB0DDD8D240}"/>
               </a:ext>
             </a:extLst>
           </p:cNvPr>
@@ -6738,7 +7216,7 @@
           <p:cNvPr id="17" name="TextBox 16">
             <a:extLst>
               <a:ext uri="{FF2B5EF4-FFF2-40B4-BE49-F238E27FC236}">
-                <a16:creationId xmlns:a16="http://schemas.microsoft.com/office/drawing/2014/main" id="{83736AB6-D7CC-48E5-B70D-786C9D0404DB}"/>
+                <a16:creationId xmlns:a16="http://schemas.microsoft.com/office/drawing/2014/main" xmlns="" id="{83736AB6-D7CC-48E5-B70D-786C9D0404DB}"/>
               </a:ext>
             </a:extLst>
           </p:cNvPr>
@@ -6774,7 +7252,7 @@
           <p:cNvPr id="18" name="TextBox 17">
             <a:extLst>
               <a:ext uri="{FF2B5EF4-FFF2-40B4-BE49-F238E27FC236}">
-                <a16:creationId xmlns:a16="http://schemas.microsoft.com/office/drawing/2014/main" id="{D3BD4412-DE2F-490A-96CE-46F2654ECC77}"/>
+                <a16:creationId xmlns:a16="http://schemas.microsoft.com/office/drawing/2014/main" xmlns="" id="{D3BD4412-DE2F-490A-96CE-46F2654ECC77}"/>
               </a:ext>
             </a:extLst>
           </p:cNvPr>
@@ -6810,7 +7288,7 @@
           <p:cNvPr id="19" name="TextBox 18">
             <a:extLst>
               <a:ext uri="{FF2B5EF4-FFF2-40B4-BE49-F238E27FC236}">
-                <a16:creationId xmlns:a16="http://schemas.microsoft.com/office/drawing/2014/main" id="{6F9A0CBB-C891-4BB9-8806-C67D663872FB}"/>
+                <a16:creationId xmlns:a16="http://schemas.microsoft.com/office/drawing/2014/main" xmlns="" id="{6F9A0CBB-C891-4BB9-8806-C67D663872FB}"/>
               </a:ext>
             </a:extLst>
           </p:cNvPr>
@@ -6835,11 +7313,19 @@
           <a:p>
             <a:r>
               <a:rPr lang="en-US" dirty="0" err="1"/>
-              <a:t>Rmarkdown</a:t>
+              <a:t>r</a:t>
+            </a:r>
+            <a:r>
+              <a:rPr lang="en-US" dirty="0" err="1" smtClean="0"/>
+              <a:t>markdown</a:t>
+            </a:r>
+            <a:r>
+              <a:rPr lang="en-US" dirty="0" smtClean="0"/>
+              <a:t> </a:t>
             </a:r>
             <a:r>
               <a:rPr lang="en-US" dirty="0"/>
-              <a:t> Automation</a:t>
+              <a:t>Automation</a:t>
             </a:r>
             <a:endParaRPr lang="en-GB" dirty="0"/>
           </a:p>
@@ -6850,7 +7336,7 @@
           <p:cNvPr id="20" name="TextBox 19">
             <a:extLst>
               <a:ext uri="{FF2B5EF4-FFF2-40B4-BE49-F238E27FC236}">
-                <a16:creationId xmlns:a16="http://schemas.microsoft.com/office/drawing/2014/main" id="{C50DE756-9D92-4DA2-A1E1-9792A890E88F}"/>
+                <a16:creationId xmlns:a16="http://schemas.microsoft.com/office/drawing/2014/main" xmlns="" id="{C50DE756-9D92-4DA2-A1E1-9792A890E88F}"/>
               </a:ext>
             </a:extLst>
           </p:cNvPr>
@@ -6886,7 +7372,7 @@
           <p:cNvPr id="21" name="Arrow: Right 20">
             <a:extLst>
               <a:ext uri="{FF2B5EF4-FFF2-40B4-BE49-F238E27FC236}">
-                <a16:creationId xmlns:a16="http://schemas.microsoft.com/office/drawing/2014/main" id="{169C81D7-8B92-47B1-BDE4-88037A79213B}"/>
+                <a16:creationId xmlns:a16="http://schemas.microsoft.com/office/drawing/2014/main" xmlns="" id="{169C81D7-8B92-47B1-BDE4-88037A79213B}"/>
               </a:ext>
             </a:extLst>
           </p:cNvPr>
@@ -6932,7 +7418,7 @@
           <p:cNvPr id="22" name="TextBox 21">
             <a:extLst>
               <a:ext uri="{FF2B5EF4-FFF2-40B4-BE49-F238E27FC236}">
-                <a16:creationId xmlns:a16="http://schemas.microsoft.com/office/drawing/2014/main" id="{2D8D649F-B197-43C2-A3D5-F88D65F08268}"/>
+                <a16:creationId xmlns:a16="http://schemas.microsoft.com/office/drawing/2014/main" xmlns="" id="{2D8D649F-B197-43C2-A3D5-F88D65F08268}"/>
               </a:ext>
             </a:extLst>
           </p:cNvPr>
@@ -6999,7 +7485,7 @@
           <p:cNvPr id="2" name="Title 1">
             <a:extLst>
               <a:ext uri="{FF2B5EF4-FFF2-40B4-BE49-F238E27FC236}">
-                <a16:creationId xmlns:a16="http://schemas.microsoft.com/office/drawing/2014/main" id="{EC74F9B8-2DCF-4CDE-BA06-8E60F3848658}"/>
+                <a16:creationId xmlns:a16="http://schemas.microsoft.com/office/drawing/2014/main" xmlns="" id="{EC74F9B8-2DCF-4CDE-BA06-8E60F3848658}"/>
               </a:ext>
             </a:extLst>
           </p:cNvPr>
@@ -7028,7 +7514,7 @@
           <p:cNvPr id="3" name="Content Placeholder 2">
             <a:extLst>
               <a:ext uri="{FF2B5EF4-FFF2-40B4-BE49-F238E27FC236}">
-                <a16:creationId xmlns:a16="http://schemas.microsoft.com/office/drawing/2014/main" id="{0DD4D2E5-1BB8-4DEB-B2FB-1EFD886F1BE6}"/>
+                <a16:creationId xmlns:a16="http://schemas.microsoft.com/office/drawing/2014/main" xmlns="" id="{0DD4D2E5-1BB8-4DEB-B2FB-1EFD886F1BE6}"/>
               </a:ext>
             </a:extLst>
           </p:cNvPr>
@@ -7114,7 +7600,7 @@
           <p:cNvPr id="2" name="Title 1">
             <a:extLst>
               <a:ext uri="{FF2B5EF4-FFF2-40B4-BE49-F238E27FC236}">
-                <a16:creationId xmlns:a16="http://schemas.microsoft.com/office/drawing/2014/main" id="{91A1B017-E368-47D5-9380-59028571CC9A}"/>
+                <a16:creationId xmlns:a16="http://schemas.microsoft.com/office/drawing/2014/main" xmlns="" id="{91A1B017-E368-47D5-9380-59028571CC9A}"/>
               </a:ext>
             </a:extLst>
           </p:cNvPr>
@@ -7136,7 +7622,11 @@
             </a:r>
             <a:r>
               <a:rPr lang="en-US" dirty="0" err="1"/>
-              <a:t>Rmarkdown</a:t>
+              <a:t>r</a:t>
+            </a:r>
+            <a:r>
+              <a:rPr lang="en-US" dirty="0" err="1" smtClean="0"/>
+              <a:t>markdown</a:t>
             </a:r>
             <a:r>
               <a:rPr lang="en-US" dirty="0"/>
@@ -7151,7 +7641,7 @@
           <p:cNvPr id="3" name="Content Placeholder 2">
             <a:extLst>
               <a:ext uri="{FF2B5EF4-FFF2-40B4-BE49-F238E27FC236}">
-                <a16:creationId xmlns:a16="http://schemas.microsoft.com/office/drawing/2014/main" id="{E1DA61EE-842A-425F-BD70-57ED6E8931D7}"/>
+                <a16:creationId xmlns:a16="http://schemas.microsoft.com/office/drawing/2014/main" xmlns="" id="{E1DA61EE-842A-425F-BD70-57ED6E8931D7}"/>
               </a:ext>
             </a:extLst>
           </p:cNvPr>
@@ -7159,7 +7649,7 @@
             <a:spLocks noGrp="1"/>
           </p:cNvSpPr>
           <p:nvPr>
-            <p:ph idx="1"/>
+            <p:ph sz="half" idx="1"/>
           </p:nvPr>
         </p:nvSpPr>
         <p:spPr/>
@@ -7179,6 +7669,36 @@
           </a:p>
         </p:txBody>
       </p:sp>
+      <p:pic>
+        <p:nvPicPr>
+          <p:cNvPr id="4" name="Picture 3"/>
+          <p:cNvPicPr>
+            <a:picLocks noChangeAspect="1"/>
+          </p:cNvPicPr>
+          <p:nvPr/>
+        </p:nvPicPr>
+        <p:blipFill>
+          <a:blip r:embed="rId2" cstate="print">
+            <a:extLst>
+              <a:ext uri="{28A0092B-C50C-407E-A947-70E740481C1C}">
+                <a14:useLocalDpi xmlns:a14="http://schemas.microsoft.com/office/drawing/2010/main" val="0"/>
+              </a:ext>
+            </a:extLst>
+          </a:blip>
+          <a:stretch>
+            <a:fillRect/>
+          </a:stretch>
+        </p:blipFill>
+        <p:spPr>
+          <a:xfrm>
+            <a:off x="6893207" y="2164622"/>
+            <a:ext cx="3460076" cy="3995351"/>
+          </a:xfrm>
+          <a:prstGeom prst="rect">
+            <a:avLst/>
+          </a:prstGeom>
+        </p:spPr>
+      </p:pic>
     </p:spTree>
     <p:extLst>
       <p:ext uri="{BB962C8B-B14F-4D97-AF65-F5344CB8AC3E}">
@@ -7214,7 +7734,7 @@
           <p:cNvPr id="2" name="Title 1">
             <a:extLst>
               <a:ext uri="{FF2B5EF4-FFF2-40B4-BE49-F238E27FC236}">
-                <a16:creationId xmlns:a16="http://schemas.microsoft.com/office/drawing/2014/main" id="{01F14D24-E3F7-4681-8CB0-5311F7408A77}"/>
+                <a16:creationId xmlns:a16="http://schemas.microsoft.com/office/drawing/2014/main" xmlns="" id="{01F14D24-E3F7-4681-8CB0-5311F7408A77}"/>
               </a:ext>
             </a:extLst>
           </p:cNvPr>
@@ -7243,7 +7763,7 @@
           <p:cNvPr id="3" name="Content Placeholder 2">
             <a:extLst>
               <a:ext uri="{FF2B5EF4-FFF2-40B4-BE49-F238E27FC236}">
-                <a16:creationId xmlns:a16="http://schemas.microsoft.com/office/drawing/2014/main" id="{C379AC93-67B9-4D23-99DB-A497086041F6}"/>
+                <a16:creationId xmlns:a16="http://schemas.microsoft.com/office/drawing/2014/main" xmlns="" id="{C379AC93-67B9-4D23-99DB-A497086041F6}"/>
               </a:ext>
             </a:extLst>
           </p:cNvPr>
@@ -7265,11 +7785,19 @@
             </a:r>
             <a:r>
               <a:rPr lang="en-US" dirty="0" err="1"/>
-              <a:t>Rmarkdown</a:t>
+              <a:t>r</a:t>
+            </a:r>
+            <a:r>
+              <a:rPr lang="en-US" dirty="0" err="1" smtClean="0"/>
+              <a:t>markdown</a:t>
+            </a:r>
+            <a:r>
+              <a:rPr lang="en-US" dirty="0" smtClean="0"/>
+              <a:t> </a:t>
             </a:r>
             <a:r>
               <a:rPr lang="en-US" dirty="0"/>
-              <a:t> comes from the ability for an analyst to </a:t>
+              <a:t>comes from the ability for an analyst to </a:t>
             </a:r>
             <a:r>
               <a:rPr lang="en-US" dirty="0" err="1"/>
@@ -7314,13 +7842,7 @@
       </p:grpSpPr>
       <p:sp>
         <p:nvSpPr>
-          <p:cNvPr id="2" name="Title 1">
-            <a:extLst>
-              <a:ext uri="{FF2B5EF4-FFF2-40B4-BE49-F238E27FC236}">
-                <a16:creationId xmlns:a16="http://schemas.microsoft.com/office/drawing/2014/main" id="{274240FC-3217-4B5E-BFDD-CD1CA1D50179}"/>
-              </a:ext>
-            </a:extLst>
-          </p:cNvPr>
+          <p:cNvPr id="2" name="Title 1"/>
           <p:cNvSpPr>
             <a:spLocks noGrp="1"/>
           </p:cNvSpPr>
@@ -7334,8 +7856,8 @@
           <a:lstStyle/>
           <a:p>
             <a:r>
-              <a:rPr lang="en-US" dirty="0"/>
-              <a:t>How does it work?</a:t>
+              <a:rPr lang="en-GB" dirty="0" smtClean="0"/>
+              <a:t>Examples</a:t>
             </a:r>
             <a:endParaRPr lang="en-GB" dirty="0"/>
           </a:p>
@@ -7343,13 +7865,7 @@
       </p:sp>
       <p:sp>
         <p:nvSpPr>
-          <p:cNvPr id="3" name="Content Placeholder 2">
-            <a:extLst>
-              <a:ext uri="{FF2B5EF4-FFF2-40B4-BE49-F238E27FC236}">
-                <a16:creationId xmlns:a16="http://schemas.microsoft.com/office/drawing/2014/main" id="{EF208AB4-5010-4481-AD1E-82F52C1EFE47}"/>
-              </a:ext>
-            </a:extLst>
-          </p:cNvPr>
+          <p:cNvPr id="3" name="Content Placeholder 2"/>
           <p:cNvSpPr>
             <a:spLocks noGrp="1"/>
           </p:cNvSpPr>
@@ -7362,60 +7878,14 @@
           <a:bodyPr/>
           <a:lstStyle/>
           <a:p>
-            <a:r>
-              <a:rPr lang="en-US" dirty="0" err="1"/>
-              <a:t>Rmarkdown</a:t>
-            </a:r>
-            <a:r>
-              <a:rPr lang="en-US" dirty="0"/>
-              <a:t> uses markdown language to generate its reports. It also supports a variety of other languages for data generation, manipulation, and </a:t>
-            </a:r>
-            <a:r>
-              <a:rPr lang="en-US" dirty="0" err="1"/>
-              <a:t>visualisation</a:t>
-            </a:r>
-            <a:r>
-              <a:rPr lang="en-US" dirty="0"/>
-              <a:t>.</a:t>
-            </a:r>
-          </a:p>
-          <a:p>
-            <a:r>
-              <a:rPr lang="en-GB" dirty="0" err="1"/>
-              <a:t>Rmarkdown</a:t>
-            </a:r>
-            <a:r>
-              <a:rPr lang="en-GB" dirty="0"/>
-              <a:t> essentially works in three main parts which we’ll look at shortly:</a:t>
-            </a:r>
-          </a:p>
-          <a:p>
-            <a:pPr lvl="1"/>
-            <a:r>
-              <a:rPr lang="en-GB" dirty="0"/>
-              <a:t>YAML – Creates and formats the specific type of report.</a:t>
-            </a:r>
-          </a:p>
-          <a:p>
-            <a:pPr lvl="1"/>
-            <a:r>
-              <a:rPr lang="en-GB" dirty="0"/>
-              <a:t>Markdown Area – Where text formatting and report outlines will go as well as some additional formatting.</a:t>
-            </a:r>
-          </a:p>
-          <a:p>
-            <a:pPr lvl="1"/>
-            <a:r>
-              <a:rPr lang="en-GB" dirty="0"/>
-              <a:t>Code area – “Chunks” where code goes that will run when the report is run.</a:t>
-            </a:r>
+            <a:endParaRPr lang="en-GB"/>
           </a:p>
         </p:txBody>
       </p:sp>
     </p:spTree>
     <p:extLst>
       <p:ext uri="{BB962C8B-B14F-4D97-AF65-F5344CB8AC3E}">
-        <p14:creationId xmlns:p14="http://schemas.microsoft.com/office/powerpoint/2010/main" val="3005884036"/>
+        <p14:creationId xmlns:p14="http://schemas.microsoft.com/office/powerpoint/2010/main" val="1366162917"/>
       </p:ext>
     </p:extLst>
   </p:cSld>
@@ -7444,86 +7914,197 @@
       </p:grpSpPr>
       <p:sp>
         <p:nvSpPr>
-          <p:cNvPr id="2" name="Title 1">
+          <p:cNvPr id="2" name="Title 1"/>
+          <p:cNvSpPr>
+            <a:spLocks noGrp="1"/>
+          </p:cNvSpPr>
+          <p:nvPr>
+            <p:ph type="title"/>
+          </p:nvPr>
+        </p:nvSpPr>
+        <p:spPr/>
+        <p:txBody>
+          <a:bodyPr/>
+          <a:lstStyle/>
+          <a:p>
+            <a:r>
+              <a:rPr lang="en-GB" dirty="0" smtClean="0"/>
+              <a:t>Creating a Report</a:t>
+            </a:r>
+            <a:endParaRPr lang="en-GB" dirty="0"/>
+          </a:p>
+        </p:txBody>
+      </p:sp>
+      <p:sp>
+        <p:nvSpPr>
+          <p:cNvPr id="3" name="Content Placeholder 2"/>
+          <p:cNvSpPr>
+            <a:spLocks noGrp="1"/>
+          </p:cNvSpPr>
+          <p:nvPr>
+            <p:ph sz="half" idx="1"/>
+          </p:nvPr>
+        </p:nvSpPr>
+        <p:spPr/>
+        <p:txBody>
+          <a:bodyPr/>
+          <a:lstStyle/>
+          <a:p>
+            <a:r>
+              <a:rPr lang="en-GB" dirty="0" smtClean="0"/>
+              <a:t>Creating an </a:t>
+            </a:r>
+            <a:r>
+              <a:rPr lang="en-GB" dirty="0" err="1"/>
+              <a:t>r</a:t>
+            </a:r>
+            <a:r>
+              <a:rPr lang="en-GB" dirty="0" err="1" smtClean="0"/>
+              <a:t>markdown</a:t>
+            </a:r>
+            <a:r>
+              <a:rPr lang="en-GB" dirty="0" smtClean="0"/>
+              <a:t> (.</a:t>
+            </a:r>
+            <a:r>
+              <a:rPr lang="en-GB" dirty="0" err="1" smtClean="0"/>
+              <a:t>rmd</a:t>
+            </a:r>
+            <a:r>
+              <a:rPr lang="en-GB" dirty="0" smtClean="0"/>
+              <a:t>) file is easy!</a:t>
+            </a:r>
+          </a:p>
+          <a:p>
+            <a:pPr lvl="1"/>
+            <a:r>
+              <a:rPr lang="en-GB" dirty="0" smtClean="0"/>
+              <a:t>Click the Paper with the green plus in the top left corner</a:t>
+            </a:r>
+          </a:p>
+          <a:p>
+            <a:pPr lvl="1"/>
+            <a:r>
+              <a:rPr lang="en-GB" dirty="0" smtClean="0"/>
+              <a:t>Generate the type of file you want and click OK</a:t>
+            </a:r>
+          </a:p>
+          <a:p>
+            <a:pPr lvl="1"/>
+            <a:r>
+              <a:rPr lang="en-GB" dirty="0" smtClean="0"/>
+              <a:t>DONE!</a:t>
+            </a:r>
+            <a:endParaRPr lang="en-GB" dirty="0"/>
+          </a:p>
+        </p:txBody>
+      </p:sp>
+      <p:pic>
+        <p:nvPicPr>
+          <p:cNvPr id="5" name="Content Placeholder 4"/>
+          <p:cNvPicPr>
+            <a:picLocks noGrp="1" noChangeAspect="1"/>
+          </p:cNvPicPr>
+          <p:nvPr>
+            <p:ph sz="half" idx="2"/>
+          </p:nvPr>
+        </p:nvPicPr>
+        <p:blipFill>
+          <a:blip r:embed="rId2">
             <a:extLst>
-              <a:ext uri="{FF2B5EF4-FFF2-40B4-BE49-F238E27FC236}">
-                <a16:creationId xmlns:a16="http://schemas.microsoft.com/office/drawing/2014/main" id="{478A1734-157B-4519-8667-19551B51AC3D}"/>
+              <a:ext uri="{28A0092B-C50C-407E-A947-70E740481C1C}">
+                <a14:useLocalDpi xmlns:a14="http://schemas.microsoft.com/office/drawing/2010/main" val="0"/>
               </a:ext>
             </a:extLst>
-          </p:cNvPr>
-          <p:cNvSpPr>
-            <a:spLocks noGrp="1"/>
-          </p:cNvSpPr>
-          <p:nvPr>
-            <p:ph type="title"/>
-          </p:nvPr>
-        </p:nvSpPr>
-        <p:spPr/>
-        <p:txBody>
-          <a:bodyPr/>
-          <a:lstStyle/>
-          <a:p>
-            <a:r>
-              <a:rPr lang="en-US" dirty="0"/>
-              <a:t>YAML – Yet Another Markdown Language</a:t>
-            </a:r>
-            <a:endParaRPr lang="en-GB" dirty="0"/>
-          </a:p>
-        </p:txBody>
-      </p:sp>
-      <p:sp>
-        <p:nvSpPr>
-          <p:cNvPr id="3" name="Content Placeholder 2">
+          </a:blip>
+          <a:stretch>
+            <a:fillRect/>
+          </a:stretch>
+        </p:blipFill>
+        <p:spPr>
+          <a:xfrm>
+            <a:off x="6106885" y="1907427"/>
+            <a:ext cx="1514899" cy="2024164"/>
+          </a:xfrm>
+        </p:spPr>
+      </p:pic>
+      <p:pic>
+        <p:nvPicPr>
+          <p:cNvPr id="6" name="Picture 5"/>
+          <p:cNvPicPr>
+            <a:picLocks noChangeAspect="1"/>
+          </p:cNvPicPr>
+          <p:nvPr/>
+        </p:nvPicPr>
+        <p:blipFill>
+          <a:blip r:embed="rId3" cstate="print">
             <a:extLst>
-              <a:ext uri="{FF2B5EF4-FFF2-40B4-BE49-F238E27FC236}">
-                <a16:creationId xmlns:a16="http://schemas.microsoft.com/office/drawing/2014/main" id="{B084246B-946B-4B51-B396-6042858FFB83}"/>
+              <a:ext uri="{28A0092B-C50C-407E-A947-70E740481C1C}">
+                <a14:useLocalDpi xmlns:a14="http://schemas.microsoft.com/office/drawing/2010/main" val="0"/>
               </a:ext>
             </a:extLst>
-          </p:cNvPr>
-          <p:cNvSpPr>
-            <a:spLocks noGrp="1"/>
-          </p:cNvSpPr>
-          <p:nvPr>
-            <p:ph idx="1"/>
-          </p:nvPr>
-        </p:nvSpPr>
-        <p:spPr/>
-        <p:txBody>
-          <a:bodyPr/>
-          <a:lstStyle/>
-          <a:p>
-            <a:r>
-              <a:rPr lang="en-US" dirty="0"/>
-              <a:t>The YAML is used to format the report as well as specify what type of output will be created.</a:t>
-            </a:r>
-          </a:p>
-          <a:p>
-            <a:pPr lvl="1"/>
-            <a:r>
-              <a:rPr lang="en-US" dirty="0"/>
-              <a:t>Options include HTML, PDF, Word, </a:t>
-            </a:r>
-            <a:r>
-              <a:rPr lang="en-US" dirty="0" err="1"/>
-              <a:t>Powerpoint</a:t>
-            </a:r>
-            <a:r>
-              <a:rPr lang="en-US" dirty="0"/>
-              <a:t>, and more……</a:t>
-            </a:r>
-          </a:p>
-        </p:txBody>
-      </p:sp>
+          </a:blip>
+          <a:stretch>
+            <a:fillRect/>
+          </a:stretch>
+        </p:blipFill>
+        <p:spPr>
+          <a:xfrm>
+            <a:off x="7760376" y="2919509"/>
+            <a:ext cx="1711496" cy="1519514"/>
+          </a:xfrm>
+          <a:prstGeom prst="rect">
+            <a:avLst/>
+          </a:prstGeom>
+        </p:spPr>
+      </p:pic>
+      <p:pic>
+        <p:nvPicPr>
+          <p:cNvPr id="7" name="Picture 6"/>
+          <p:cNvPicPr>
+            <a:picLocks noChangeAspect="1"/>
+          </p:cNvPicPr>
+          <p:nvPr/>
+        </p:nvPicPr>
+        <p:blipFill>
+          <a:blip r:embed="rId4" cstate="print">
+            <a:extLst>
+              <a:ext uri="{28A0092B-C50C-407E-A947-70E740481C1C}">
+                <a14:useLocalDpi xmlns:a14="http://schemas.microsoft.com/office/drawing/2010/main" val="0"/>
+              </a:ext>
+            </a:extLst>
+          </a:blip>
+          <a:stretch>
+            <a:fillRect/>
+          </a:stretch>
+        </p:blipFill>
+        <p:spPr>
+          <a:xfrm>
+            <a:off x="8438887" y="4595783"/>
+            <a:ext cx="3464102" cy="2183957"/>
+          </a:xfrm>
+          <a:prstGeom prst="rect">
+            <a:avLst/>
+          </a:prstGeom>
+        </p:spPr>
+      </p:pic>
     </p:spTree>
     <p:extLst>
       <p:ext uri="{BB962C8B-B14F-4D97-AF65-F5344CB8AC3E}">
-        <p14:creationId xmlns:p14="http://schemas.microsoft.com/office/powerpoint/2010/main" val="3443849723"/>
+        <p14:creationId xmlns:p14="http://schemas.microsoft.com/office/powerpoint/2010/main" val="4110696000"/>
       </p:ext>
     </p:extLst>
   </p:cSld>
   <p:clrMapOvr>
     <a:masterClrMapping/>
   </p:clrMapOvr>
+  <p:timing>
+    <p:tnLst>
+      <p:par>
+        <p:cTn id="1" dur="indefinite" restart="never" nodeType="tmRoot"/>
+      </p:par>
+    </p:tnLst>
+  </p:timing>
 </p:sld>
 </file>
 
@@ -7549,7 +8130,7 @@
           <p:cNvPr id="2" name="Title 1">
             <a:extLst>
               <a:ext uri="{FF2B5EF4-FFF2-40B4-BE49-F238E27FC236}">
-                <a16:creationId xmlns:a16="http://schemas.microsoft.com/office/drawing/2014/main" id="{47889A0E-484A-4318-8C14-077538768011}"/>
+                <a16:creationId xmlns:a16="http://schemas.microsoft.com/office/drawing/2014/main" xmlns="" id="{274240FC-3217-4B5E-BFDD-CD1CA1D50179}"/>
               </a:ext>
             </a:extLst>
           </p:cNvPr>
@@ -7567,7 +8148,7 @@
           <a:p>
             <a:r>
               <a:rPr lang="en-US" dirty="0"/>
-              <a:t>Markdown Area</a:t>
+              <a:t>How does it work?</a:t>
             </a:r>
             <a:endParaRPr lang="en-GB" dirty="0"/>
           </a:p>
@@ -7578,7 +8159,7 @@
           <p:cNvPr id="3" name="Content Placeholder 2">
             <a:extLst>
               <a:ext uri="{FF2B5EF4-FFF2-40B4-BE49-F238E27FC236}">
-                <a16:creationId xmlns:a16="http://schemas.microsoft.com/office/drawing/2014/main" id="{18830ADE-7DB5-4DE5-BF28-EF61CAB83822}"/>
+                <a16:creationId xmlns:a16="http://schemas.microsoft.com/office/drawing/2014/main" xmlns="" id="{EF208AB4-5010-4481-AD1E-82F52C1EFE47}"/>
               </a:ext>
             </a:extLst>
           </p:cNvPr>
@@ -7595,15 +8176,67 @@
           <a:lstStyle/>
           <a:p>
             <a:r>
+              <a:rPr lang="en-US" dirty="0" err="1"/>
+              <a:t>r</a:t>
+            </a:r>
+            <a:r>
+              <a:rPr lang="en-US" dirty="0" err="1" smtClean="0"/>
+              <a:t>markdown</a:t>
+            </a:r>
+            <a:r>
+              <a:rPr lang="en-US" dirty="0" smtClean="0"/>
+              <a:t> </a:t>
+            </a:r>
+            <a:r>
               <a:rPr lang="en-US" dirty="0"/>
-              <a:t>The Markdown Area is used to format within the report itself.</a:t>
+              <a:t>uses markdown language to generate its reports. It also supports a variety of other languages for data generation, manipulation, and </a:t>
+            </a:r>
+            <a:r>
+              <a:rPr lang="en-US" dirty="0" err="1"/>
+              <a:t>visualisation</a:t>
+            </a:r>
+            <a:r>
+              <a:rPr lang="en-US" dirty="0"/>
+              <a:t>.</a:t>
+            </a:r>
+          </a:p>
+          <a:p>
+            <a:r>
+              <a:rPr lang="en-GB" dirty="0" err="1"/>
+              <a:t>r</a:t>
+            </a:r>
+            <a:r>
+              <a:rPr lang="en-GB" dirty="0" err="1" smtClean="0"/>
+              <a:t>markdown</a:t>
+            </a:r>
+            <a:r>
+              <a:rPr lang="en-GB" dirty="0" smtClean="0"/>
+              <a:t> </a:t>
+            </a:r>
+            <a:r>
+              <a:rPr lang="en-GB" dirty="0"/>
+              <a:t>essentially works in three main parts which we’ll look at shortly:</a:t>
             </a:r>
           </a:p>
           <a:p>
             <a:pPr lvl="1"/>
             <a:r>
-              <a:rPr lang="en-US" dirty="0"/>
-              <a:t>Examples include: Headers, Tabs, Bolds, Italics, Lists, Numbered Lists, and more….</a:t>
+              <a:rPr lang="en-GB" dirty="0"/>
+              <a:t>YAML – Creates and formats the specific type of report.</a:t>
+            </a:r>
+          </a:p>
+          <a:p>
+            <a:pPr lvl="1"/>
+            <a:r>
+              <a:rPr lang="en-GB" dirty="0"/>
+              <a:t>Markdown Area – Where text formatting and report outlines will go as well as some additional formatting.</a:t>
+            </a:r>
+          </a:p>
+          <a:p>
+            <a:pPr lvl="1"/>
+            <a:r>
+              <a:rPr lang="en-GB" dirty="0"/>
+              <a:t>Code area – “Chunks” where code goes that will run when the report is run.</a:t>
             </a:r>
           </a:p>
         </p:txBody>
@@ -7611,13 +8244,20 @@
     </p:spTree>
     <p:extLst>
       <p:ext uri="{BB962C8B-B14F-4D97-AF65-F5344CB8AC3E}">
-        <p14:creationId xmlns:p14="http://schemas.microsoft.com/office/powerpoint/2010/main" val="3299984132"/>
+        <p14:creationId xmlns:p14="http://schemas.microsoft.com/office/powerpoint/2010/main" val="3005884036"/>
       </p:ext>
     </p:extLst>
   </p:cSld>
   <p:clrMapOvr>
     <a:masterClrMapping/>
   </p:clrMapOvr>
+  <p:timing>
+    <p:tnLst>
+      <p:par>
+        <p:cTn id="1" dur="indefinite" restart="never" nodeType="tmRoot"/>
+      </p:par>
+    </p:tnLst>
+  </p:timing>
 </p:sld>
 </file>
 
@@ -7643,7 +8283,7 @@
           <p:cNvPr id="2" name="Title 1">
             <a:extLst>
               <a:ext uri="{FF2B5EF4-FFF2-40B4-BE49-F238E27FC236}">
-                <a16:creationId xmlns:a16="http://schemas.microsoft.com/office/drawing/2014/main" id="{D0A6DE59-9408-4F11-912A-3DD00F5D7FDB}"/>
+                <a16:creationId xmlns:a16="http://schemas.microsoft.com/office/drawing/2014/main" xmlns="" id="{478A1734-157B-4519-8667-19551B51AC3D}"/>
               </a:ext>
             </a:extLst>
           </p:cNvPr>
@@ -7661,7 +8301,7 @@
           <a:p>
             <a:r>
               <a:rPr lang="en-US" dirty="0"/>
-              <a:t>Code Area</a:t>
+              <a:t>YAML – Yet Another Markdown Language</a:t>
             </a:r>
             <a:endParaRPr lang="en-GB" dirty="0"/>
           </a:p>
@@ -7672,7 +8312,7 @@
           <p:cNvPr id="3" name="Content Placeholder 2">
             <a:extLst>
               <a:ext uri="{FF2B5EF4-FFF2-40B4-BE49-F238E27FC236}">
-                <a16:creationId xmlns:a16="http://schemas.microsoft.com/office/drawing/2014/main" id="{CA71E659-FCAD-433B-906F-740C5E3CACC0}"/>
+                <a16:creationId xmlns:a16="http://schemas.microsoft.com/office/drawing/2014/main" xmlns="" id="{B084246B-946B-4B51-B396-6042858FFB83}"/>
               </a:ext>
             </a:extLst>
           </p:cNvPr>
@@ -7680,7 +8320,7 @@
             <a:spLocks noGrp="1"/>
           </p:cNvSpPr>
           <p:nvPr>
-            <p:ph idx="1"/>
+            <p:ph sz="half" idx="1"/>
           </p:nvPr>
         </p:nvSpPr>
         <p:spPr/>
@@ -7690,36 +8330,72 @@
           <a:p>
             <a:r>
               <a:rPr lang="en-US" dirty="0"/>
-              <a:t>The Coding Area is used as a space to develop code for the markdown report.</a:t>
-            </a:r>
-          </a:p>
-          <a:p>
+              <a:t>The YAML is used to format the report as well as specify what type of output will be created.</a:t>
+            </a:r>
+          </a:p>
+          <a:p>
+            <a:pPr lvl="1"/>
             <a:r>
               <a:rPr lang="en-US" dirty="0"/>
-              <a:t>The majority of times the final output of these code chunks will be some type of </a:t>
+              <a:t>Options include HTML, PDF, Word, </a:t>
             </a:r>
             <a:r>
               <a:rPr lang="en-US" dirty="0" err="1"/>
-              <a:t>visualisation</a:t>
+              <a:t>Powerpoint</a:t>
             </a:r>
             <a:r>
               <a:rPr lang="en-US" dirty="0"/>
-              <a:t> (graph, table, etc.)</a:t>
-            </a:r>
-            <a:endParaRPr lang="en-GB" dirty="0"/>
-          </a:p>
-        </p:txBody>
-      </p:sp>
+              <a:t>, and more……</a:t>
+            </a:r>
+          </a:p>
+        </p:txBody>
+      </p:sp>
+      <p:pic>
+        <p:nvPicPr>
+          <p:cNvPr id="5" name="Content Placeholder 4"/>
+          <p:cNvPicPr>
+            <a:picLocks noGrp="1" noChangeAspect="1"/>
+          </p:cNvPicPr>
+          <p:nvPr>
+            <p:ph sz="half" idx="2"/>
+          </p:nvPr>
+        </p:nvPicPr>
+        <p:blipFill>
+          <a:blip r:embed="rId2">
+            <a:extLst>
+              <a:ext uri="{28A0092B-C50C-407E-A947-70E740481C1C}">
+                <a14:useLocalDpi xmlns:a14="http://schemas.microsoft.com/office/drawing/2010/main" val="0"/>
+              </a:ext>
+            </a:extLst>
+          </a:blip>
+          <a:stretch>
+            <a:fillRect/>
+          </a:stretch>
+        </p:blipFill>
+        <p:spPr>
+          <a:xfrm>
+            <a:off x="6343135" y="3239805"/>
+            <a:ext cx="5494638" cy="1603726"/>
+          </a:xfrm>
+        </p:spPr>
+      </p:pic>
     </p:spTree>
     <p:extLst>
       <p:ext uri="{BB962C8B-B14F-4D97-AF65-F5344CB8AC3E}">
-        <p14:creationId xmlns:p14="http://schemas.microsoft.com/office/powerpoint/2010/main" val="3800950481"/>
+        <p14:creationId xmlns:p14="http://schemas.microsoft.com/office/powerpoint/2010/main" val="3443849723"/>
       </p:ext>
     </p:extLst>
   </p:cSld>
   <p:clrMapOvr>
     <a:masterClrMapping/>
   </p:clrMapOvr>
+  <p:timing>
+    <p:tnLst>
+      <p:par>
+        <p:cTn id="1" dur="indefinite" restart="never" nodeType="tmRoot"/>
+      </p:par>
+    </p:tnLst>
+  </p:timing>
 </p:sld>
 </file>
 

</xml_diff>

<commit_message>
Adding Parameterisation and Automation exercises and solutions
</commit_message>
<xml_diff>
--- a/Intro to Rmarkdown.pptx
+++ b/Intro to Rmarkdown.pptx
@@ -5,7 +5,7 @@
     <p:sldMasterId id="2147483837" r:id="rId1"/>
   </p:sldMasterIdLst>
   <p:notesMasterIdLst>
-    <p:notesMasterId r:id="rId17"/>
+    <p:notesMasterId r:id="rId18"/>
   </p:notesMasterIdLst>
   <p:sldIdLst>
     <p:sldId id="256" r:id="rId2"/>
@@ -23,6 +23,7 @@
     <p:sldId id="264" r:id="rId14"/>
     <p:sldId id="265" r:id="rId15"/>
     <p:sldId id="267" r:id="rId16"/>
+    <p:sldId id="272" r:id="rId17"/>
   </p:sldIdLst>
   <p:sldSz cx="12192000" cy="6858000"/>
   <p:notesSz cx="6858000" cy="9144000"/>
@@ -586,7 +587,7 @@
           <a:effectLst/>
           <a:extLst>
             <a:ext uri="{91240B29-F687-4f45-9708-019B960494DF}">
-              <a14:hiddenLine xmlns="" xmlns:a14="http://schemas.microsoft.com/office/drawing/2010/main" w="9525">
+              <a14:hiddenLine xmlns:a14="http://schemas.microsoft.com/office/drawing/2010/main" xmlns="" w="9525">
                 <a:solidFill>
                   <a:srgbClr val="000000"/>
                 </a:solidFill>
@@ -2108,7 +2109,7 @@
           <a:ln/>
           <a:extLst>
             <a:ext uri="{91240B29-F687-4f45-9708-019B960494DF}">
-              <a14:hiddenLine xmlns="" xmlns:a14="http://schemas.microsoft.com/office/drawing/2010/main" w="9525">
+              <a14:hiddenLine xmlns:a14="http://schemas.microsoft.com/office/drawing/2010/main" xmlns="" w="9525">
                 <a:solidFill>
                   <a:srgbClr val="000000"/>
                 </a:solidFill>
@@ -2383,7 +2384,7 @@
           <a:ln/>
           <a:extLst>
             <a:ext uri="{91240B29-F687-4f45-9708-019B960494DF}">
-              <a14:hiddenLine xmlns="" xmlns:a14="http://schemas.microsoft.com/office/drawing/2010/main" w="9525">
+              <a14:hiddenLine xmlns:a14="http://schemas.microsoft.com/office/drawing/2010/main" xmlns="" w="9525">
                 <a:solidFill>
                   <a:srgbClr val="000000"/>
                 </a:solidFill>
@@ -2666,7 +2667,7 @@
           <a:ln/>
           <a:extLst>
             <a:ext uri="{91240B29-F687-4f45-9708-019B960494DF}">
-              <a14:hiddenLine xmlns="" xmlns:a14="http://schemas.microsoft.com/office/drawing/2010/main" w="9525">
+              <a14:hiddenLine xmlns:a14="http://schemas.microsoft.com/office/drawing/2010/main" xmlns="" w="9525">
                 <a:solidFill>
                   <a:srgbClr val="000000"/>
                 </a:solidFill>
@@ -3292,7 +3293,7 @@
           <a:ln/>
           <a:extLst>
             <a:ext uri="{91240B29-F687-4f45-9708-019B960494DF}">
-              <a14:hiddenLine xmlns="" xmlns:a14="http://schemas.microsoft.com/office/drawing/2010/main" w="9525">
+              <a14:hiddenLine xmlns:a14="http://schemas.microsoft.com/office/drawing/2010/main" xmlns="" w="9525">
                 <a:solidFill>
                   <a:srgbClr val="000000"/>
                 </a:solidFill>
@@ -3631,7 +3632,7 @@
           <a:ln/>
           <a:extLst>
             <a:ext uri="{91240B29-F687-4f45-9708-019B960494DF}">
-              <a14:hiddenLine xmlns="" xmlns:a14="http://schemas.microsoft.com/office/drawing/2010/main" w="9525">
+              <a14:hiddenLine xmlns:a14="http://schemas.microsoft.com/office/drawing/2010/main" xmlns="" w="9525">
                 <a:solidFill>
                   <a:srgbClr val="000000"/>
                 </a:solidFill>
@@ -4108,7 +4109,7 @@
           <a:ln/>
           <a:extLst>
             <a:ext uri="{91240B29-F687-4f45-9708-019B960494DF}">
-              <a14:hiddenLine xmlns="" xmlns:a14="http://schemas.microsoft.com/office/drawing/2010/main" w="9525">
+              <a14:hiddenLine xmlns:a14="http://schemas.microsoft.com/office/drawing/2010/main" xmlns="" w="9525">
                 <a:solidFill>
                   <a:srgbClr val="000000"/>
                 </a:solidFill>
@@ -4537,7 +4538,7 @@
           <a:ln/>
           <a:extLst>
             <a:ext uri="{91240B29-F687-4f45-9708-019B960494DF}">
-              <a14:hiddenLine xmlns="" xmlns:a14="http://schemas.microsoft.com/office/drawing/2010/main" w="9525">
+              <a14:hiddenLine xmlns:a14="http://schemas.microsoft.com/office/drawing/2010/main" xmlns="" w="9525">
                 <a:solidFill>
                   <a:srgbClr val="000000"/>
                 </a:solidFill>
@@ -5778,7 +5779,7 @@
           <p:cNvPr id="2" name="Title 1">
             <a:extLst>
               <a:ext uri="{FF2B5EF4-FFF2-40B4-BE49-F238E27FC236}">
-                <a16:creationId xmlns:a16="http://schemas.microsoft.com/office/drawing/2014/main" xmlns="" id="{5C5EEDBB-F5EC-40C4-921B-BDE3CDD90F83}"/>
+                <a16:creationId xmlns:a16="http://schemas.microsoft.com/office/drawing/2014/main" id="{5C5EEDBB-F5EC-40C4-921B-BDE3CDD90F83}"/>
               </a:ext>
             </a:extLst>
           </p:cNvPr>
@@ -5800,11 +5801,7 @@
             </a:r>
             <a:r>
               <a:rPr lang="en-US" dirty="0" err="1"/>
-              <a:t>r</a:t>
-            </a:r>
-            <a:r>
-              <a:rPr lang="en-US" dirty="0" err="1" smtClean="0"/>
-              <a:t>markdown</a:t>
+              <a:t>rmarkdown</a:t>
             </a:r>
             <a:endParaRPr lang="en-GB" dirty="0"/>
           </a:p>
@@ -5815,7 +5812,7 @@
           <p:cNvPr id="3" name="Subtitle 2">
             <a:extLst>
               <a:ext uri="{FF2B5EF4-FFF2-40B4-BE49-F238E27FC236}">
-                <a16:creationId xmlns:a16="http://schemas.microsoft.com/office/drawing/2014/main" xmlns="" id="{48D483F8-83A4-49EA-B4D9-394022B2C9EA}"/>
+                <a16:creationId xmlns:a16="http://schemas.microsoft.com/office/drawing/2014/main" id="{48D483F8-83A4-49EA-B4D9-394022B2C9EA}"/>
               </a:ext>
             </a:extLst>
           </p:cNvPr>
@@ -5874,7 +5871,7 @@
           <p:cNvPr id="2" name="Title 1">
             <a:extLst>
               <a:ext uri="{FF2B5EF4-FFF2-40B4-BE49-F238E27FC236}">
-                <a16:creationId xmlns:a16="http://schemas.microsoft.com/office/drawing/2014/main" xmlns="" id="{47889A0E-484A-4318-8C14-077538768011}"/>
+                <a16:creationId xmlns:a16="http://schemas.microsoft.com/office/drawing/2014/main" id="{47889A0E-484A-4318-8C14-077538768011}"/>
               </a:ext>
             </a:extLst>
           </p:cNvPr>
@@ -5903,7 +5900,7 @@
           <p:cNvPr id="3" name="Content Placeholder 2">
             <a:extLst>
               <a:ext uri="{FF2B5EF4-FFF2-40B4-BE49-F238E27FC236}">
-                <a16:creationId xmlns:a16="http://schemas.microsoft.com/office/drawing/2014/main" xmlns="" id="{18830ADE-7DB5-4DE5-BF28-EF61CAB83822}"/>
+                <a16:creationId xmlns:a16="http://schemas.microsoft.com/office/drawing/2014/main" id="{18830ADE-7DB5-4DE5-BF28-EF61CAB83822}"/>
               </a:ext>
             </a:extLst>
           </p:cNvPr>
@@ -5973,13 +5970,6 @@
   <p:clrMapOvr>
     <a:masterClrMapping/>
   </p:clrMapOvr>
-  <p:timing>
-    <p:tnLst>
-      <p:par>
-        <p:cTn id="1" dur="indefinite" restart="never" nodeType="tmRoot"/>
-      </p:par>
-    </p:tnLst>
-  </p:timing>
 </p:sld>
 </file>
 
@@ -6005,7 +5995,7 @@
           <p:cNvPr id="2" name="Title 1">
             <a:extLst>
               <a:ext uri="{FF2B5EF4-FFF2-40B4-BE49-F238E27FC236}">
-                <a16:creationId xmlns:a16="http://schemas.microsoft.com/office/drawing/2014/main" xmlns="" id="{D0A6DE59-9408-4F11-912A-3DD00F5D7FDB}"/>
+                <a16:creationId xmlns:a16="http://schemas.microsoft.com/office/drawing/2014/main" id="{D0A6DE59-9408-4F11-912A-3DD00F5D7FDB}"/>
               </a:ext>
             </a:extLst>
           </p:cNvPr>
@@ -6034,7 +6024,7 @@
           <p:cNvPr id="3" name="Content Placeholder 2">
             <a:extLst>
               <a:ext uri="{FF2B5EF4-FFF2-40B4-BE49-F238E27FC236}">
-                <a16:creationId xmlns:a16="http://schemas.microsoft.com/office/drawing/2014/main" xmlns="" id="{CA71E659-FCAD-433B-906F-740C5E3CACC0}"/>
+                <a16:creationId xmlns:a16="http://schemas.microsoft.com/office/drawing/2014/main" id="{CA71E659-FCAD-433B-906F-740C5E3CACC0}"/>
               </a:ext>
             </a:extLst>
           </p:cNvPr>
@@ -6055,16 +6045,12 @@
               <a:t>The Coding Area is used as a space to develop code for the </a:t>
             </a:r>
             <a:r>
-              <a:rPr lang="en-US" dirty="0" err="1" smtClean="0"/>
+              <a:rPr lang="en-US" dirty="0" err="1"/>
               <a:t>rmarkdown</a:t>
             </a:r>
             <a:r>
-              <a:rPr lang="en-US" dirty="0" smtClean="0"/>
-              <a:t> </a:t>
-            </a:r>
-            <a:r>
               <a:rPr lang="en-US" dirty="0"/>
-              <a:t>report.</a:t>
+              <a:t> report.</a:t>
             </a:r>
           </a:p>
           <a:p>
@@ -6123,13 +6109,6 @@
   <p:clrMapOvr>
     <a:masterClrMapping/>
   </p:clrMapOvr>
-  <p:timing>
-    <p:tnLst>
-      <p:par>
-        <p:cTn id="1" dur="indefinite" restart="never" nodeType="tmRoot"/>
-      </p:par>
-    </p:tnLst>
-  </p:timing>
 </p:sld>
 </file>
 
@@ -6166,10 +6145,9 @@
           <a:lstStyle/>
           <a:p>
             <a:r>
-              <a:rPr lang="en-GB" dirty="0" smtClean="0"/>
+              <a:rPr lang="en-GB" dirty="0"/>
               <a:t>SHOWCASE</a:t>
             </a:r>
-            <a:endParaRPr lang="en-GB" dirty="0"/>
           </a:p>
         </p:txBody>
       </p:sp>
@@ -6189,10 +6167,9 @@
           <a:lstStyle/>
           <a:p>
             <a:r>
-              <a:rPr lang="en-GB" dirty="0" smtClean="0"/>
+              <a:rPr lang="en-GB" dirty="0"/>
               <a:t>Let’s See Your Efforts!</a:t>
             </a:r>
-            <a:endParaRPr lang="en-GB" dirty="0"/>
           </a:p>
         </p:txBody>
       </p:sp>
@@ -6231,7 +6208,7 @@
           <p:cNvPr id="2" name="Title 1">
             <a:extLst>
               <a:ext uri="{FF2B5EF4-FFF2-40B4-BE49-F238E27FC236}">
-                <a16:creationId xmlns:a16="http://schemas.microsoft.com/office/drawing/2014/main" xmlns="" id="{803DFFF8-B6AC-498F-ACA6-25B7E59BD99D}"/>
+                <a16:creationId xmlns:a16="http://schemas.microsoft.com/office/drawing/2014/main" id="{803DFFF8-B6AC-498F-ACA6-25B7E59BD99D}"/>
               </a:ext>
             </a:extLst>
           </p:cNvPr>
@@ -6256,16 +6233,8 @@
               <a:t> </a:t>
             </a:r>
             <a:r>
-              <a:rPr lang="en-US" dirty="0" err="1" smtClean="0"/>
-              <a:t>r</a:t>
-            </a:r>
-            <a:r>
               <a:rPr lang="en-US" dirty="0" err="1"/>
-              <a:t>m</a:t>
-            </a:r>
-            <a:r>
-              <a:rPr lang="en-US" dirty="0" err="1" smtClean="0"/>
-              <a:t>arkdown</a:t>
+              <a:t>rmarkdown</a:t>
             </a:r>
             <a:endParaRPr lang="en-GB" dirty="0"/>
           </a:p>
@@ -6276,7 +6245,7 @@
           <p:cNvPr id="3" name="Content Placeholder 2">
             <a:extLst>
               <a:ext uri="{FF2B5EF4-FFF2-40B4-BE49-F238E27FC236}">
-                <a16:creationId xmlns:a16="http://schemas.microsoft.com/office/drawing/2014/main" xmlns="" id="{875DB145-5A65-42B0-A087-1B117A4DE96D}"/>
+                <a16:creationId xmlns:a16="http://schemas.microsoft.com/office/drawing/2014/main" id="{875DB145-5A65-42B0-A087-1B117A4DE96D}"/>
               </a:ext>
             </a:extLst>
           </p:cNvPr>
@@ -6293,21 +6262,16 @@
           <a:lstStyle/>
           <a:p>
             <a:r>
-              <a:rPr lang="en-GB" dirty="0" smtClean="0"/>
-              <a:t>Parameterised reports allow you to creat</a:t>
-            </a:r>
-            <a:r>
-              <a:rPr lang="en-GB" dirty="0" smtClean="0"/>
-              <a:t>e multiple reports with different inputs (like working with functions)</a:t>
+              <a:rPr lang="en-GB" dirty="0"/>
+              <a:t>Parameterised reports allow you to create multiple reports with different inputs (like working with functions)</a:t>
             </a:r>
           </a:p>
           <a:p>
             <a:pPr lvl="1"/>
             <a:r>
-              <a:rPr lang="en-GB" dirty="0" smtClean="0"/>
+              <a:rPr lang="en-GB" dirty="0"/>
               <a:t>The input parameter will take the location of every named parameter space</a:t>
             </a:r>
-            <a:endParaRPr lang="en-GB" dirty="0"/>
           </a:p>
         </p:txBody>
       </p:sp>
@@ -6380,13 +6344,6 @@
   <p:clrMapOvr>
     <a:masterClrMapping/>
   </p:clrMapOvr>
-  <p:timing>
-    <p:tnLst>
-      <p:par>
-        <p:cTn id="1" dur="indefinite" restart="never" nodeType="tmRoot"/>
-      </p:par>
-    </p:tnLst>
-  </p:timing>
 </p:sld>
 </file>
 
@@ -6412,7 +6369,7 @@
           <p:cNvPr id="2" name="Title 1">
             <a:extLst>
               <a:ext uri="{FF2B5EF4-FFF2-40B4-BE49-F238E27FC236}">
-                <a16:creationId xmlns:a16="http://schemas.microsoft.com/office/drawing/2014/main" xmlns="" id="{24B0D75E-47A9-4006-856F-1796279C28A1}"/>
+                <a16:creationId xmlns:a16="http://schemas.microsoft.com/office/drawing/2014/main" id="{24B0D75E-47A9-4006-856F-1796279C28A1}"/>
               </a:ext>
             </a:extLst>
           </p:cNvPr>
@@ -6434,19 +6391,11 @@
             </a:r>
             <a:r>
               <a:rPr lang="en-US" dirty="0" err="1"/>
-              <a:t>r</a:t>
-            </a:r>
-            <a:r>
-              <a:rPr lang="en-US" dirty="0" err="1" smtClean="0"/>
-              <a:t>markdown</a:t>
-            </a:r>
-            <a:r>
-              <a:rPr lang="en-US" dirty="0" smtClean="0"/>
-              <a:t> </a:t>
+              <a:t>rmarkdown</a:t>
             </a:r>
             <a:r>
               <a:rPr lang="en-US" dirty="0"/>
-              <a:t>Automation</a:t>
+              <a:t> Automation</a:t>
             </a:r>
             <a:endParaRPr lang="en-GB" dirty="0"/>
           </a:p>
@@ -6457,7 +6406,7 @@
           <p:cNvPr id="3" name="Content Placeholder 2">
             <a:extLst>
               <a:ext uri="{FF2B5EF4-FFF2-40B4-BE49-F238E27FC236}">
-                <a16:creationId xmlns:a16="http://schemas.microsoft.com/office/drawing/2014/main" xmlns="" id="{88737558-6FD9-4E18-8785-608C60B072A3}"/>
+                <a16:creationId xmlns:a16="http://schemas.microsoft.com/office/drawing/2014/main" id="{88737558-6FD9-4E18-8785-608C60B072A3}"/>
               </a:ext>
             </a:extLst>
           </p:cNvPr>
@@ -6479,19 +6428,11 @@
             </a:r>
             <a:r>
               <a:rPr lang="en-US" dirty="0" err="1"/>
-              <a:t>r</a:t>
-            </a:r>
-            <a:r>
-              <a:rPr lang="en-US" dirty="0" err="1" smtClean="0"/>
-              <a:t>markdown</a:t>
-            </a:r>
-            <a:r>
-              <a:rPr lang="en-US" dirty="0" smtClean="0"/>
-              <a:t> </a:t>
+              <a:t>rmarkdown</a:t>
             </a:r>
             <a:r>
               <a:rPr lang="en-US" dirty="0"/>
-              <a:t>itself is a package there are some functions that can be used to generate reports on the fly.</a:t>
+              <a:t> itself is a package there are some functions that can be used to generate reports on the fly.</a:t>
             </a:r>
             <a:endParaRPr lang="en-GB" dirty="0"/>
           </a:p>
@@ -6532,7 +6473,7 @@
           <p:cNvPr id="2" name="Title 1">
             <a:extLst>
               <a:ext uri="{FF2B5EF4-FFF2-40B4-BE49-F238E27FC236}">
-                <a16:creationId xmlns:a16="http://schemas.microsoft.com/office/drawing/2014/main" xmlns="" id="{C82F3B74-90EE-40C9-A0AE-6341F0A75B43}"/>
+                <a16:creationId xmlns:a16="http://schemas.microsoft.com/office/drawing/2014/main" id="{C82F3B74-90EE-40C9-A0AE-6341F0A75B43}"/>
               </a:ext>
             </a:extLst>
           </p:cNvPr>
@@ -6561,7 +6502,7 @@
           <p:cNvPr id="3" name="Content Placeholder 2">
             <a:extLst>
               <a:ext uri="{FF2B5EF4-FFF2-40B4-BE49-F238E27FC236}">
-                <a16:creationId xmlns:a16="http://schemas.microsoft.com/office/drawing/2014/main" xmlns="" id="{D3A11F84-BA84-4EE4-B76A-06C91354F4D1}"/>
+                <a16:creationId xmlns:a16="http://schemas.microsoft.com/office/drawing/2014/main" id="{D3A11F84-BA84-4EE4-B76A-06C91354F4D1}"/>
               </a:ext>
             </a:extLst>
           </p:cNvPr>
@@ -6583,11 +6524,7 @@
             </a:r>
             <a:r>
               <a:rPr lang="en-US" dirty="0" err="1"/>
-              <a:t>r</a:t>
-            </a:r>
-            <a:r>
-              <a:rPr lang="en-US" dirty="0" err="1" smtClean="0"/>
-              <a:t>markdown</a:t>
+              <a:t>rmarkdown</a:t>
             </a:r>
             <a:r>
               <a:rPr lang="en-US" dirty="0"/>
@@ -6601,6 +6538,121 @@
     <p:extLst>
       <p:ext uri="{BB962C8B-B14F-4D97-AF65-F5344CB8AC3E}">
         <p14:creationId xmlns:p14="http://schemas.microsoft.com/office/powerpoint/2010/main" val="206638690"/>
+      </p:ext>
+    </p:extLst>
+  </p:cSld>
+  <p:clrMapOvr>
+    <a:masterClrMapping/>
+  </p:clrMapOvr>
+</p:sld>
+</file>
+
+<file path=ppt/slides/slide16.xml><?xml version="1.0" encoding="utf-8"?>
+<p:sld xmlns:a="http://schemas.openxmlformats.org/drawingml/2006/main" xmlns:r="http://schemas.openxmlformats.org/officeDocument/2006/relationships" xmlns:p="http://schemas.openxmlformats.org/presentationml/2006/main">
+  <p:cSld>
+    <p:spTree>
+      <p:nvGrpSpPr>
+        <p:cNvPr id="1" name=""/>
+        <p:cNvGrpSpPr/>
+        <p:nvPr/>
+      </p:nvGrpSpPr>
+      <p:grpSpPr>
+        <a:xfrm>
+          <a:off x="0" y="0"/>
+          <a:ext cx="0" cy="0"/>
+          <a:chOff x="0" y="0"/>
+          <a:chExt cx="0" cy="0"/>
+        </a:xfrm>
+      </p:grpSpPr>
+      <p:sp>
+        <p:nvSpPr>
+          <p:cNvPr id="2" name="Title 1">
+            <a:extLst>
+              <a:ext uri="{FF2B5EF4-FFF2-40B4-BE49-F238E27FC236}">
+                <a16:creationId xmlns:a16="http://schemas.microsoft.com/office/drawing/2014/main" id="{25FD2458-20B5-4EC7-87DC-81E5E6C16E3D}"/>
+              </a:ext>
+            </a:extLst>
+          </p:cNvPr>
+          <p:cNvSpPr>
+            <a:spLocks noGrp="1"/>
+          </p:cNvSpPr>
+          <p:nvPr>
+            <p:ph type="title"/>
+          </p:nvPr>
+        </p:nvSpPr>
+        <p:spPr/>
+        <p:txBody>
+          <a:bodyPr/>
+          <a:lstStyle/>
+          <a:p>
+            <a:r>
+              <a:rPr lang="en-US" dirty="0"/>
+              <a:t>Acknowledgements</a:t>
+            </a:r>
+            <a:endParaRPr lang="en-GB" dirty="0"/>
+          </a:p>
+        </p:txBody>
+      </p:sp>
+      <p:sp>
+        <p:nvSpPr>
+          <p:cNvPr id="3" name="Content Placeholder 2">
+            <a:extLst>
+              <a:ext uri="{FF2B5EF4-FFF2-40B4-BE49-F238E27FC236}">
+                <a16:creationId xmlns:a16="http://schemas.microsoft.com/office/drawing/2014/main" id="{0CD0DCCA-B928-4D75-8ACB-F71E89265A11}"/>
+              </a:ext>
+            </a:extLst>
+          </p:cNvPr>
+          <p:cNvSpPr>
+            <a:spLocks noGrp="1"/>
+          </p:cNvSpPr>
+          <p:nvPr>
+            <p:ph idx="1"/>
+          </p:nvPr>
+        </p:nvSpPr>
+        <p:spPr/>
+        <p:txBody>
+          <a:bodyPr/>
+          <a:lstStyle/>
+          <a:p>
+            <a:r>
+              <a:rPr lang="en-US" dirty="0"/>
+              <a:t>NHS-R Community</a:t>
+            </a:r>
+          </a:p>
+          <a:p>
+            <a:r>
+              <a:rPr lang="en-US" dirty="0"/>
+              <a:t>Chris </a:t>
+            </a:r>
+            <a:r>
+              <a:rPr lang="en-US" dirty="0" err="1"/>
+              <a:t>Beeley</a:t>
+            </a:r>
+            <a:endParaRPr lang="en-US" dirty="0"/>
+          </a:p>
+          <a:p>
+            <a:r>
+              <a:rPr lang="en-US" dirty="0"/>
+              <a:t>Zoe Turner</a:t>
+            </a:r>
+          </a:p>
+          <a:p>
+            <a:r>
+              <a:rPr lang="en-US" dirty="0"/>
+              <a:t>Mohammed </a:t>
+            </a:r>
+            <a:r>
+              <a:rPr lang="en-US" dirty="0" err="1"/>
+              <a:t>Mohammed</a:t>
+            </a:r>
+            <a:endParaRPr lang="en-US" dirty="0"/>
+          </a:p>
+        </p:txBody>
+      </p:sp>
+    </p:spTree>
+    <p:extLst>
+      <p:ext uri="{BB962C8B-B14F-4D97-AF65-F5344CB8AC3E}">
+        <p14:creationId xmlns:p14="http://schemas.microsoft.com/office/powerpoint/2010/main" val="3624106730"/>
       </p:ext>
     </p:extLst>
   </p:cSld>
@@ -6632,7 +6684,7 @@
           <p:cNvPr id="2" name="Arrow: Right 1">
             <a:extLst>
               <a:ext uri="{FF2B5EF4-FFF2-40B4-BE49-F238E27FC236}">
-                <a16:creationId xmlns:a16="http://schemas.microsoft.com/office/drawing/2014/main" xmlns="" id="{FB6262E4-5594-4D19-80C9-DF1F37EBA37E}"/>
+                <a16:creationId xmlns:a16="http://schemas.microsoft.com/office/drawing/2014/main" id="{FB6262E4-5594-4D19-80C9-DF1F37EBA37E}"/>
               </a:ext>
             </a:extLst>
           </p:cNvPr>
@@ -6641,7 +6693,7 @@
         </p:nvSpPr>
         <p:spPr>
           <a:xfrm>
-            <a:off x="8030404" y="2634300"/>
+            <a:off x="7918975" y="2644396"/>
             <a:ext cx="778556" cy="374033"/>
           </a:xfrm>
           <a:prstGeom prst="rightArrow">
@@ -6678,7 +6730,7 @@
           <p:cNvPr id="3" name="Arrow: Right 2">
             <a:extLst>
               <a:ext uri="{FF2B5EF4-FFF2-40B4-BE49-F238E27FC236}">
-                <a16:creationId xmlns:a16="http://schemas.microsoft.com/office/drawing/2014/main" xmlns="" id="{6E3EE2E6-8CD4-4AC1-A196-934ACF9EF206}"/>
+                <a16:creationId xmlns:a16="http://schemas.microsoft.com/office/drawing/2014/main" id="{6E3EE2E6-8CD4-4AC1-A196-934ACF9EF206}"/>
               </a:ext>
             </a:extLst>
           </p:cNvPr>
@@ -6724,7 +6776,7 @@
           <p:cNvPr id="4" name="Arrow: Right 3">
             <a:extLst>
               <a:ext uri="{FF2B5EF4-FFF2-40B4-BE49-F238E27FC236}">
-                <a16:creationId xmlns:a16="http://schemas.microsoft.com/office/drawing/2014/main" xmlns="" id="{4A4CD125-79D2-4DF5-8711-59DD4C76F050}"/>
+                <a16:creationId xmlns:a16="http://schemas.microsoft.com/office/drawing/2014/main" id="{4A4CD125-79D2-4DF5-8711-59DD4C76F050}"/>
               </a:ext>
             </a:extLst>
           </p:cNvPr>
@@ -6770,7 +6822,7 @@
           <p:cNvPr id="5" name="Arrow: Right 4">
             <a:extLst>
               <a:ext uri="{FF2B5EF4-FFF2-40B4-BE49-F238E27FC236}">
-                <a16:creationId xmlns:a16="http://schemas.microsoft.com/office/drawing/2014/main" xmlns="" id="{F739A2BD-ECC1-4D1E-A85A-5C876EB21740}"/>
+                <a16:creationId xmlns:a16="http://schemas.microsoft.com/office/drawing/2014/main" id="{F739A2BD-ECC1-4D1E-A85A-5C876EB21740}"/>
               </a:ext>
             </a:extLst>
           </p:cNvPr>
@@ -6816,7 +6868,7 @@
           <p:cNvPr id="6" name="Arrow: Right 5">
             <a:extLst>
               <a:ext uri="{FF2B5EF4-FFF2-40B4-BE49-F238E27FC236}">
-                <a16:creationId xmlns:a16="http://schemas.microsoft.com/office/drawing/2014/main" xmlns="" id="{C2A32E66-8488-4503-A537-082B5958F4A4}"/>
+                <a16:creationId xmlns:a16="http://schemas.microsoft.com/office/drawing/2014/main" id="{C2A32E66-8488-4503-A537-082B5958F4A4}"/>
               </a:ext>
             </a:extLst>
           </p:cNvPr>
@@ -6862,7 +6914,7 @@
           <p:cNvPr id="7" name="Arrow: Right 6">
             <a:extLst>
               <a:ext uri="{FF2B5EF4-FFF2-40B4-BE49-F238E27FC236}">
-                <a16:creationId xmlns:a16="http://schemas.microsoft.com/office/drawing/2014/main" xmlns="" id="{7D088966-E675-4563-9EBF-61CE71A7886E}"/>
+                <a16:creationId xmlns:a16="http://schemas.microsoft.com/office/drawing/2014/main" id="{7D088966-E675-4563-9EBF-61CE71A7886E}"/>
               </a:ext>
             </a:extLst>
           </p:cNvPr>
@@ -6908,7 +6960,7 @@
           <p:cNvPr id="8" name="Arrow: Right 7">
             <a:extLst>
               <a:ext uri="{FF2B5EF4-FFF2-40B4-BE49-F238E27FC236}">
-                <a16:creationId xmlns:a16="http://schemas.microsoft.com/office/drawing/2014/main" xmlns="" id="{C63E3BE6-0E9F-4B02-8ACE-03F575F73B36}"/>
+                <a16:creationId xmlns:a16="http://schemas.microsoft.com/office/drawing/2014/main" id="{C63E3BE6-0E9F-4B02-8ACE-03F575F73B36}"/>
               </a:ext>
             </a:extLst>
           </p:cNvPr>
@@ -6954,7 +7006,7 @@
           <p:cNvPr id="9" name="Arrow: Right 8">
             <a:extLst>
               <a:ext uri="{FF2B5EF4-FFF2-40B4-BE49-F238E27FC236}">
-                <a16:creationId xmlns:a16="http://schemas.microsoft.com/office/drawing/2014/main" xmlns="" id="{ED5684BE-AEA1-4DA9-812F-A2D9478D6635}"/>
+                <a16:creationId xmlns:a16="http://schemas.microsoft.com/office/drawing/2014/main" id="{ED5684BE-AEA1-4DA9-812F-A2D9478D6635}"/>
               </a:ext>
             </a:extLst>
           </p:cNvPr>
@@ -7000,7 +7052,7 @@
           <p:cNvPr id="10" name="TextBox 9">
             <a:extLst>
               <a:ext uri="{FF2B5EF4-FFF2-40B4-BE49-F238E27FC236}">
-                <a16:creationId xmlns:a16="http://schemas.microsoft.com/office/drawing/2014/main" xmlns="" id="{C0AE8BC0-19EE-4191-8041-ACB214A759CC}"/>
+                <a16:creationId xmlns:a16="http://schemas.microsoft.com/office/drawing/2014/main" id="{C0AE8BC0-19EE-4191-8041-ACB214A759CC}"/>
               </a:ext>
             </a:extLst>
           </p:cNvPr>
@@ -7036,7 +7088,7 @@
           <p:cNvPr id="11" name="TextBox 10">
             <a:extLst>
               <a:ext uri="{FF2B5EF4-FFF2-40B4-BE49-F238E27FC236}">
-                <a16:creationId xmlns:a16="http://schemas.microsoft.com/office/drawing/2014/main" xmlns="" id="{61B98CCF-F1CB-459B-94A2-6E3FC3D6D86E}"/>
+                <a16:creationId xmlns:a16="http://schemas.microsoft.com/office/drawing/2014/main" id="{61B98CCF-F1CB-459B-94A2-6E3FC3D6D86E}"/>
               </a:ext>
             </a:extLst>
           </p:cNvPr>
@@ -7072,7 +7124,7 @@
           <p:cNvPr id="13" name="TextBox 12">
             <a:extLst>
               <a:ext uri="{FF2B5EF4-FFF2-40B4-BE49-F238E27FC236}">
-                <a16:creationId xmlns:a16="http://schemas.microsoft.com/office/drawing/2014/main" xmlns="" id="{F40738C9-8925-42F2-AA6F-40989454A9A0}"/>
+                <a16:creationId xmlns:a16="http://schemas.microsoft.com/office/drawing/2014/main" id="{F40738C9-8925-42F2-AA6F-40989454A9A0}"/>
               </a:ext>
             </a:extLst>
           </p:cNvPr>
@@ -7108,7 +7160,7 @@
           <p:cNvPr id="14" name="TextBox 13">
             <a:extLst>
               <a:ext uri="{FF2B5EF4-FFF2-40B4-BE49-F238E27FC236}">
-                <a16:creationId xmlns:a16="http://schemas.microsoft.com/office/drawing/2014/main" xmlns="" id="{B083AAA7-A047-477D-905A-CB9230CDB14E}"/>
+                <a16:creationId xmlns:a16="http://schemas.microsoft.com/office/drawing/2014/main" id="{B083AAA7-A047-477D-905A-CB9230CDB14E}"/>
               </a:ext>
             </a:extLst>
           </p:cNvPr>
@@ -7144,7 +7196,7 @@
           <p:cNvPr id="15" name="TextBox 14">
             <a:extLst>
               <a:ext uri="{FF2B5EF4-FFF2-40B4-BE49-F238E27FC236}">
-                <a16:creationId xmlns:a16="http://schemas.microsoft.com/office/drawing/2014/main" xmlns="" id="{506DC021-A6D0-41F5-888E-41564AF8001D}"/>
+                <a16:creationId xmlns:a16="http://schemas.microsoft.com/office/drawing/2014/main" id="{506DC021-A6D0-41F5-888E-41564AF8001D}"/>
               </a:ext>
             </a:extLst>
           </p:cNvPr>
@@ -7180,7 +7232,7 @@
           <p:cNvPr id="16" name="TextBox 15">
             <a:extLst>
               <a:ext uri="{FF2B5EF4-FFF2-40B4-BE49-F238E27FC236}">
-                <a16:creationId xmlns:a16="http://schemas.microsoft.com/office/drawing/2014/main" xmlns="" id="{0A3AED55-BA85-4974-A6F2-6BB0DDD8D240}"/>
+                <a16:creationId xmlns:a16="http://schemas.microsoft.com/office/drawing/2014/main" id="{0A3AED55-BA85-4974-A6F2-6BB0DDD8D240}"/>
               </a:ext>
             </a:extLst>
           </p:cNvPr>
@@ -7216,7 +7268,7 @@
           <p:cNvPr id="17" name="TextBox 16">
             <a:extLst>
               <a:ext uri="{FF2B5EF4-FFF2-40B4-BE49-F238E27FC236}">
-                <a16:creationId xmlns:a16="http://schemas.microsoft.com/office/drawing/2014/main" xmlns="" id="{83736AB6-D7CC-48E5-B70D-786C9D0404DB}"/>
+                <a16:creationId xmlns:a16="http://schemas.microsoft.com/office/drawing/2014/main" id="{83736AB6-D7CC-48E5-B70D-786C9D0404DB}"/>
               </a:ext>
             </a:extLst>
           </p:cNvPr>
@@ -7252,7 +7304,7 @@
           <p:cNvPr id="18" name="TextBox 17">
             <a:extLst>
               <a:ext uri="{FF2B5EF4-FFF2-40B4-BE49-F238E27FC236}">
-                <a16:creationId xmlns:a16="http://schemas.microsoft.com/office/drawing/2014/main" xmlns="" id="{D3BD4412-DE2F-490A-96CE-46F2654ECC77}"/>
+                <a16:creationId xmlns:a16="http://schemas.microsoft.com/office/drawing/2014/main" id="{D3BD4412-DE2F-490A-96CE-46F2654ECC77}"/>
               </a:ext>
             </a:extLst>
           </p:cNvPr>
@@ -7261,7 +7313,7 @@
         </p:nvSpPr>
         <p:spPr>
           <a:xfrm>
-            <a:off x="9119950" y="2588308"/>
+            <a:off x="9134622" y="2644396"/>
             <a:ext cx="2329070" cy="369332"/>
           </a:xfrm>
           <a:prstGeom prst="rect">
@@ -7288,7 +7340,7 @@
           <p:cNvPr id="19" name="TextBox 18">
             <a:extLst>
               <a:ext uri="{FF2B5EF4-FFF2-40B4-BE49-F238E27FC236}">
-                <a16:creationId xmlns:a16="http://schemas.microsoft.com/office/drawing/2014/main" xmlns="" id="{6F9A0CBB-C891-4BB9-8806-C67D663872FB}"/>
+                <a16:creationId xmlns:a16="http://schemas.microsoft.com/office/drawing/2014/main" id="{6F9A0CBB-C891-4BB9-8806-C67D663872FB}"/>
               </a:ext>
             </a:extLst>
           </p:cNvPr>
@@ -7313,19 +7365,11 @@
           <a:p>
             <a:r>
               <a:rPr lang="en-US" dirty="0" err="1"/>
-              <a:t>r</a:t>
-            </a:r>
-            <a:r>
-              <a:rPr lang="en-US" dirty="0" err="1" smtClean="0"/>
-              <a:t>markdown</a:t>
-            </a:r>
-            <a:r>
-              <a:rPr lang="en-US" dirty="0" smtClean="0"/>
-              <a:t> </a:t>
+              <a:t>rmarkdown</a:t>
             </a:r>
             <a:r>
               <a:rPr lang="en-US" dirty="0"/>
-              <a:t>Automation</a:t>
+              <a:t> Automation</a:t>
             </a:r>
             <a:endParaRPr lang="en-GB" dirty="0"/>
           </a:p>
@@ -7336,7 +7380,7 @@
           <p:cNvPr id="20" name="TextBox 19">
             <a:extLst>
               <a:ext uri="{FF2B5EF4-FFF2-40B4-BE49-F238E27FC236}">
-                <a16:creationId xmlns:a16="http://schemas.microsoft.com/office/drawing/2014/main" xmlns="" id="{C50DE756-9D92-4DA2-A1E1-9792A890E88F}"/>
+                <a16:creationId xmlns:a16="http://schemas.microsoft.com/office/drawing/2014/main" id="{C50DE756-9D92-4DA2-A1E1-9792A890E88F}"/>
               </a:ext>
             </a:extLst>
           </p:cNvPr>
@@ -7372,7 +7416,7 @@
           <p:cNvPr id="21" name="Arrow: Right 20">
             <a:extLst>
               <a:ext uri="{FF2B5EF4-FFF2-40B4-BE49-F238E27FC236}">
-                <a16:creationId xmlns:a16="http://schemas.microsoft.com/office/drawing/2014/main" xmlns="" id="{169C81D7-8B92-47B1-BDE4-88037A79213B}"/>
+                <a16:creationId xmlns:a16="http://schemas.microsoft.com/office/drawing/2014/main" id="{169C81D7-8B92-47B1-BDE4-88037A79213B}"/>
               </a:ext>
             </a:extLst>
           </p:cNvPr>
@@ -7418,7 +7462,7 @@
           <p:cNvPr id="22" name="TextBox 21">
             <a:extLst>
               <a:ext uri="{FF2B5EF4-FFF2-40B4-BE49-F238E27FC236}">
-                <a16:creationId xmlns:a16="http://schemas.microsoft.com/office/drawing/2014/main" xmlns="" id="{2D8D649F-B197-43C2-A3D5-F88D65F08268}"/>
+                <a16:creationId xmlns:a16="http://schemas.microsoft.com/office/drawing/2014/main" id="{2D8D649F-B197-43C2-A3D5-F88D65F08268}"/>
               </a:ext>
             </a:extLst>
           </p:cNvPr>
@@ -7447,6 +7491,43 @@
               <a:t>WORKSHOP  PLAN</a:t>
             </a:r>
             <a:endParaRPr lang="en-GB" sz="3600" dirty="0"/>
+          </a:p>
+        </p:txBody>
+      </p:sp>
+      <p:sp>
+        <p:nvSpPr>
+          <p:cNvPr id="23" name="TextBox 22">
+            <a:extLst>
+              <a:ext uri="{FF2B5EF4-FFF2-40B4-BE49-F238E27FC236}">
+                <a16:creationId xmlns:a16="http://schemas.microsoft.com/office/drawing/2014/main" id="{362218E4-CA9A-42E8-AB15-292FD4369F6F}"/>
+              </a:ext>
+            </a:extLst>
+          </p:cNvPr>
+          <p:cNvSpPr txBox="1"/>
+          <p:nvPr/>
+        </p:nvSpPr>
+        <p:spPr>
+          <a:xfrm>
+            <a:off x="7398587" y="2048420"/>
+            <a:ext cx="1736035" cy="369332"/>
+          </a:xfrm>
+          <a:prstGeom prst="rect">
+            <a:avLst/>
+          </a:prstGeom>
+          <a:noFill/>
+        </p:spPr>
+        <p:txBody>
+          <a:bodyPr wrap="square" rtlCol="0">
+            <a:spAutoFit/>
+          </a:bodyPr>
+          <a:lstStyle/>
+          <a:p>
+            <a:pPr algn="ctr"/>
+            <a:r>
+              <a:rPr lang="en-US" dirty="0"/>
+              <a:t>LUNCH BREAK</a:t>
+            </a:r>
+            <a:endParaRPr lang="en-GB" dirty="0"/>
           </a:p>
         </p:txBody>
       </p:sp>
@@ -7485,7 +7566,7 @@
           <p:cNvPr id="2" name="Title 1">
             <a:extLst>
               <a:ext uri="{FF2B5EF4-FFF2-40B4-BE49-F238E27FC236}">
-                <a16:creationId xmlns:a16="http://schemas.microsoft.com/office/drawing/2014/main" xmlns="" id="{EC74F9B8-2DCF-4CDE-BA06-8E60F3848658}"/>
+                <a16:creationId xmlns:a16="http://schemas.microsoft.com/office/drawing/2014/main" id="{EC74F9B8-2DCF-4CDE-BA06-8E60F3848658}"/>
               </a:ext>
             </a:extLst>
           </p:cNvPr>
@@ -7514,7 +7595,7 @@
           <p:cNvPr id="3" name="Content Placeholder 2">
             <a:extLst>
               <a:ext uri="{FF2B5EF4-FFF2-40B4-BE49-F238E27FC236}">
-                <a16:creationId xmlns:a16="http://schemas.microsoft.com/office/drawing/2014/main" xmlns="" id="{0DD4D2E5-1BB8-4DEB-B2FB-1EFD886F1BE6}"/>
+                <a16:creationId xmlns:a16="http://schemas.microsoft.com/office/drawing/2014/main" id="{0DD4D2E5-1BB8-4DEB-B2FB-1EFD886F1BE6}"/>
               </a:ext>
             </a:extLst>
           </p:cNvPr>
@@ -7560,7 +7641,7 @@
           <a:p>
             <a:r>
               <a:rPr lang="en-US" sz="2000" dirty="0"/>
-              <a:t>What is the usual toolset you use for reporting?</a:t>
+              <a:t>What tools do you use for your reporting?</a:t>
             </a:r>
           </a:p>
         </p:txBody>
@@ -7600,7 +7681,7 @@
           <p:cNvPr id="2" name="Title 1">
             <a:extLst>
               <a:ext uri="{FF2B5EF4-FFF2-40B4-BE49-F238E27FC236}">
-                <a16:creationId xmlns:a16="http://schemas.microsoft.com/office/drawing/2014/main" xmlns="" id="{91A1B017-E368-47D5-9380-59028571CC9A}"/>
+                <a16:creationId xmlns:a16="http://schemas.microsoft.com/office/drawing/2014/main" id="{91A1B017-E368-47D5-9380-59028571CC9A}"/>
               </a:ext>
             </a:extLst>
           </p:cNvPr>
@@ -7622,11 +7703,7 @@
             </a:r>
             <a:r>
               <a:rPr lang="en-US" dirty="0" err="1"/>
-              <a:t>r</a:t>
-            </a:r>
-            <a:r>
-              <a:rPr lang="en-US" dirty="0" err="1" smtClean="0"/>
-              <a:t>markdown</a:t>
+              <a:t>rmarkdown</a:t>
             </a:r>
             <a:r>
               <a:rPr lang="en-US" dirty="0"/>
@@ -7641,7 +7718,7 @@
           <p:cNvPr id="3" name="Content Placeholder 2">
             <a:extLst>
               <a:ext uri="{FF2B5EF4-FFF2-40B4-BE49-F238E27FC236}">
-                <a16:creationId xmlns:a16="http://schemas.microsoft.com/office/drawing/2014/main" xmlns="" id="{E1DA61EE-842A-425F-BD70-57ED6E8931D7}"/>
+                <a16:creationId xmlns:a16="http://schemas.microsoft.com/office/drawing/2014/main" id="{E1DA61EE-842A-425F-BD70-57ED6E8931D7}"/>
               </a:ext>
             </a:extLst>
           </p:cNvPr>
@@ -7664,6 +7741,20 @@
             <a:r>
               <a:rPr lang="en-US" dirty="0"/>
               <a:t> (and other packages) facilitate the development and production of highly versatile reports.</a:t>
+            </a:r>
+          </a:p>
+          <a:p>
+            <a:r>
+              <a:rPr lang="en-US" dirty="0"/>
+              <a:t>In simplest its simplest use </a:t>
+            </a:r>
+            <a:r>
+              <a:rPr lang="en-US" dirty="0" err="1"/>
+              <a:t>rmarkdown</a:t>
+            </a:r>
+            <a:r>
+              <a:rPr lang="en-US" dirty="0"/>
+              <a:t> can be seen as a type of code notebook where an analyst can create reproducible and accurate historical records.</a:t>
             </a:r>
             <a:endParaRPr lang="en-GB" dirty="0"/>
           </a:p>
@@ -7734,7 +7825,7 @@
           <p:cNvPr id="2" name="Title 1">
             <a:extLst>
               <a:ext uri="{FF2B5EF4-FFF2-40B4-BE49-F238E27FC236}">
-                <a16:creationId xmlns:a16="http://schemas.microsoft.com/office/drawing/2014/main" xmlns="" id="{01F14D24-E3F7-4681-8CB0-5311F7408A77}"/>
+                <a16:creationId xmlns:a16="http://schemas.microsoft.com/office/drawing/2014/main" id="{01F14D24-E3F7-4681-8CB0-5311F7408A77}"/>
               </a:ext>
             </a:extLst>
           </p:cNvPr>
@@ -7763,7 +7854,7 @@
           <p:cNvPr id="3" name="Content Placeholder 2">
             <a:extLst>
               <a:ext uri="{FF2B5EF4-FFF2-40B4-BE49-F238E27FC236}">
-                <a16:creationId xmlns:a16="http://schemas.microsoft.com/office/drawing/2014/main" xmlns="" id="{C379AC93-67B9-4D23-99DB-A497086041F6}"/>
+                <a16:creationId xmlns:a16="http://schemas.microsoft.com/office/drawing/2014/main" id="{C379AC93-67B9-4D23-99DB-A497086041F6}"/>
               </a:ext>
             </a:extLst>
           </p:cNvPr>
@@ -7785,19 +7876,11 @@
             </a:r>
             <a:r>
               <a:rPr lang="en-US" dirty="0" err="1"/>
-              <a:t>r</a:t>
-            </a:r>
-            <a:r>
-              <a:rPr lang="en-US" dirty="0" err="1" smtClean="0"/>
-              <a:t>markdown</a:t>
-            </a:r>
-            <a:r>
-              <a:rPr lang="en-US" dirty="0" smtClean="0"/>
-              <a:t> </a:t>
+              <a:t>rmarkdown</a:t>
             </a:r>
             <a:r>
               <a:rPr lang="en-US" dirty="0"/>
-              <a:t>comes from the ability for an analyst to </a:t>
+              <a:t> comes from the ability for an analyst to </a:t>
             </a:r>
             <a:r>
               <a:rPr lang="en-US" dirty="0" err="1"/>
@@ -7807,6 +7890,15 @@
               <a:rPr lang="en-US" dirty="0"/>
               <a:t> their code into an easy to read and reproducible report.</a:t>
             </a:r>
+          </a:p>
+          <a:p>
+            <a:r>
+              <a:rPr lang="en-US" dirty="0"/>
+              <a:t>In our data world creating reproducible analyses is essential for continuity and accuracy.</a:t>
+            </a:r>
+          </a:p>
+          <a:p>
+            <a:endParaRPr lang="en-US" dirty="0"/>
           </a:p>
         </p:txBody>
       </p:sp>
@@ -7856,21 +7948,26 @@
           <a:lstStyle/>
           <a:p>
             <a:r>
-              <a:rPr lang="en-GB" dirty="0" smtClean="0"/>
+              <a:rPr lang="en-GB" dirty="0"/>
               <a:t>Examples</a:t>
             </a:r>
-            <a:endParaRPr lang="en-GB" dirty="0"/>
-          </a:p>
-        </p:txBody>
-      </p:sp>
-      <p:sp>
-        <p:nvSpPr>
-          <p:cNvPr id="3" name="Content Placeholder 2"/>
-          <p:cNvSpPr>
-            <a:spLocks noGrp="1"/>
-          </p:cNvSpPr>
-          <p:nvPr>
-            <p:ph idx="1"/>
+          </a:p>
+        </p:txBody>
+      </p:sp>
+      <p:sp>
+        <p:nvSpPr>
+          <p:cNvPr id="10" name="Text Placeholder 9">
+            <a:extLst>
+              <a:ext uri="{FF2B5EF4-FFF2-40B4-BE49-F238E27FC236}">
+                <a16:creationId xmlns:a16="http://schemas.microsoft.com/office/drawing/2014/main" id="{2617C926-5040-40D9-86DF-E39C50F5E851}"/>
+              </a:ext>
+            </a:extLst>
+          </p:cNvPr>
+          <p:cNvSpPr>
+            <a:spLocks noGrp="1"/>
+          </p:cNvSpPr>
+          <p:nvPr>
+            <p:ph type="body" idx="1"/>
           </p:nvPr>
         </p:nvSpPr>
         <p:spPr/>
@@ -7882,6 +7979,163 @@
           </a:p>
         </p:txBody>
       </p:sp>
+      <p:pic>
+        <p:nvPicPr>
+          <p:cNvPr id="5" name="Content Placeholder 4" descr="Chart&#10;&#10;Description automatically generated">
+            <a:extLst>
+              <a:ext uri="{FF2B5EF4-FFF2-40B4-BE49-F238E27FC236}">
+                <a16:creationId xmlns:a16="http://schemas.microsoft.com/office/drawing/2014/main" id="{8D28D725-51CD-4D8E-8702-2F5FF9461E22}"/>
+              </a:ext>
+            </a:extLst>
+          </p:cNvPr>
+          <p:cNvPicPr>
+            <a:picLocks noGrp="1" noChangeAspect="1"/>
+          </p:cNvPicPr>
+          <p:nvPr>
+            <p:ph sz="half" idx="2"/>
+          </p:nvPr>
+        </p:nvPicPr>
+        <p:blipFill>
+          <a:blip r:embed="rId2">
+            <a:extLst>
+              <a:ext uri="{28A0092B-C50C-407E-A947-70E740481C1C}">
+                <a14:useLocalDpi xmlns:a14="http://schemas.microsoft.com/office/drawing/2010/main" val="0"/>
+              </a:ext>
+            </a:extLst>
+          </a:blip>
+          <a:stretch>
+            <a:fillRect/>
+          </a:stretch>
+        </p:blipFill>
+        <p:spPr>
+          <a:xfrm>
+            <a:off x="1811186" y="2751138"/>
+            <a:ext cx="3195940" cy="3109912"/>
+          </a:xfrm>
+        </p:spPr>
+      </p:pic>
+      <p:sp>
+        <p:nvSpPr>
+          <p:cNvPr id="11" name="Text Placeholder 10">
+            <a:extLst>
+              <a:ext uri="{FF2B5EF4-FFF2-40B4-BE49-F238E27FC236}">
+                <a16:creationId xmlns:a16="http://schemas.microsoft.com/office/drawing/2014/main" id="{1A6506A4-2FA4-4526-9657-BB8AE35E3320}"/>
+              </a:ext>
+            </a:extLst>
+          </p:cNvPr>
+          <p:cNvSpPr>
+            <a:spLocks noGrp="1"/>
+          </p:cNvSpPr>
+          <p:nvPr>
+            <p:ph type="body" sz="quarter" idx="3"/>
+          </p:nvPr>
+        </p:nvSpPr>
+        <p:spPr/>
+        <p:txBody>
+          <a:bodyPr/>
+          <a:lstStyle/>
+          <a:p>
+            <a:endParaRPr lang="en-GB"/>
+          </a:p>
+        </p:txBody>
+      </p:sp>
+      <p:sp>
+        <p:nvSpPr>
+          <p:cNvPr id="12" name="Content Placeholder 11">
+            <a:extLst>
+              <a:ext uri="{FF2B5EF4-FFF2-40B4-BE49-F238E27FC236}">
+                <a16:creationId xmlns:a16="http://schemas.microsoft.com/office/drawing/2014/main" id="{F8D1B2E0-63D7-4088-8A0F-6D7E96DC13AA}"/>
+              </a:ext>
+            </a:extLst>
+          </p:cNvPr>
+          <p:cNvSpPr>
+            <a:spLocks noGrp="1"/>
+          </p:cNvSpPr>
+          <p:nvPr>
+            <p:ph sz="quarter" idx="4"/>
+          </p:nvPr>
+        </p:nvSpPr>
+        <p:spPr/>
+        <p:txBody>
+          <a:bodyPr/>
+          <a:lstStyle/>
+          <a:p>
+            <a:endParaRPr lang="en-GB"/>
+          </a:p>
+        </p:txBody>
+      </p:sp>
+      <p:pic>
+        <p:nvPicPr>
+          <p:cNvPr id="7" name="Picture 6" descr="Table&#10;&#10;Description automatically generated">
+            <a:extLst>
+              <a:ext uri="{FF2B5EF4-FFF2-40B4-BE49-F238E27FC236}">
+                <a16:creationId xmlns:a16="http://schemas.microsoft.com/office/drawing/2014/main" id="{85E6E850-1E82-46E6-811C-15705F5A887E}"/>
+              </a:ext>
+            </a:extLst>
+          </p:cNvPr>
+          <p:cNvPicPr>
+            <a:picLocks noChangeAspect="1"/>
+          </p:cNvPicPr>
+          <p:nvPr/>
+        </p:nvPicPr>
+        <p:blipFill>
+          <a:blip r:embed="rId3">
+            <a:extLst>
+              <a:ext uri="{28A0092B-C50C-407E-A947-70E740481C1C}">
+                <a14:useLocalDpi xmlns:a14="http://schemas.microsoft.com/office/drawing/2010/main" val="0"/>
+              </a:ext>
+            </a:extLst>
+          </a:blip>
+          <a:stretch>
+            <a:fillRect/>
+          </a:stretch>
+        </p:blipFill>
+        <p:spPr>
+          <a:xfrm>
+            <a:off x="726408" y="2283932"/>
+            <a:ext cx="5194289" cy="4365468"/>
+          </a:xfrm>
+          <a:prstGeom prst="rect">
+            <a:avLst/>
+          </a:prstGeom>
+        </p:spPr>
+      </p:pic>
+      <p:pic>
+        <p:nvPicPr>
+          <p:cNvPr id="9" name="Picture 8" descr="Chart&#10;&#10;Description automatically generated">
+            <a:extLst>
+              <a:ext uri="{FF2B5EF4-FFF2-40B4-BE49-F238E27FC236}">
+                <a16:creationId xmlns:a16="http://schemas.microsoft.com/office/drawing/2014/main" id="{D1C60240-BB74-4F35-8631-28A4B1FFE361}"/>
+              </a:ext>
+            </a:extLst>
+          </p:cNvPr>
+          <p:cNvPicPr>
+            <a:picLocks noChangeAspect="1"/>
+          </p:cNvPicPr>
+          <p:nvPr/>
+        </p:nvPicPr>
+        <p:blipFill>
+          <a:blip r:embed="rId2">
+            <a:extLst>
+              <a:ext uri="{28A0092B-C50C-407E-A947-70E740481C1C}">
+                <a14:useLocalDpi xmlns:a14="http://schemas.microsoft.com/office/drawing/2010/main" val="0"/>
+              </a:ext>
+            </a:extLst>
+          </a:blip>
+          <a:stretch>
+            <a:fillRect/>
+          </a:stretch>
+        </p:blipFill>
+        <p:spPr>
+          <a:xfrm>
+            <a:off x="6103527" y="2283932"/>
+            <a:ext cx="5189857" cy="4365468"/>
+          </a:xfrm>
+          <a:prstGeom prst="rect">
+            <a:avLst/>
+          </a:prstGeom>
+        </p:spPr>
+      </p:pic>
     </p:spTree>
     <p:extLst>
       <p:ext uri="{BB962C8B-B14F-4D97-AF65-F5344CB8AC3E}">
@@ -7928,10 +8182,9 @@
           <a:lstStyle/>
           <a:p>
             <a:r>
-              <a:rPr lang="en-GB" dirty="0" smtClean="0"/>
+              <a:rPr lang="en-GB" dirty="0"/>
               <a:t>Creating a Report</a:t>
             </a:r>
-            <a:endParaRPr lang="en-GB" dirty="0"/>
           </a:p>
         </p:txBody>
       </p:sp>
@@ -7951,51 +8204,46 @@
           <a:lstStyle/>
           <a:p>
             <a:r>
-              <a:rPr lang="en-GB" dirty="0" smtClean="0"/>
+              <a:rPr lang="en-GB" dirty="0"/>
               <a:t>Creating an </a:t>
             </a:r>
             <a:r>
               <a:rPr lang="en-GB" dirty="0" err="1"/>
-              <a:t>r</a:t>
-            </a:r>
-            <a:r>
-              <a:rPr lang="en-GB" dirty="0" err="1" smtClean="0"/>
-              <a:t>markdown</a:t>
-            </a:r>
-            <a:r>
-              <a:rPr lang="en-GB" dirty="0" smtClean="0"/>
+              <a:t>rmarkdown</a:t>
+            </a:r>
+            <a:r>
+              <a:rPr lang="en-GB" dirty="0"/>
               <a:t> (.</a:t>
             </a:r>
             <a:r>
-              <a:rPr lang="en-GB" dirty="0" err="1" smtClean="0"/>
+              <a:rPr lang="en-GB" dirty="0" err="1"/>
               <a:t>rmd</a:t>
             </a:r>
             <a:r>
-              <a:rPr lang="en-GB" dirty="0" smtClean="0"/>
+              <a:rPr lang="en-GB" dirty="0"/>
               <a:t>) file is easy!</a:t>
             </a:r>
           </a:p>
           <a:p>
             <a:pPr lvl="1"/>
             <a:r>
-              <a:rPr lang="en-GB" dirty="0" smtClean="0"/>
+              <a:rPr lang="en-GB" dirty="0"/>
               <a:t>Click the Paper with the green plus in the top left corner</a:t>
             </a:r>
           </a:p>
           <a:p>
             <a:pPr lvl="1"/>
             <a:r>
-              <a:rPr lang="en-GB" dirty="0" smtClean="0"/>
+              <a:rPr lang="en-GB" dirty="0"/>
               <a:t>Generate the type of file you want and click OK</a:t>
             </a:r>
           </a:p>
           <a:p>
             <a:pPr lvl="1"/>
             <a:r>
-              <a:rPr lang="en-GB" dirty="0" smtClean="0"/>
+              <a:rPr lang="en-GB" dirty="0"/>
               <a:t>DONE!</a:t>
             </a:r>
-            <a:endParaRPr lang="en-GB" dirty="0"/>
           </a:p>
         </p:txBody>
       </p:sp>
@@ -8098,13 +8346,6 @@
   <p:clrMapOvr>
     <a:masterClrMapping/>
   </p:clrMapOvr>
-  <p:timing>
-    <p:tnLst>
-      <p:par>
-        <p:cTn id="1" dur="indefinite" restart="never" nodeType="tmRoot"/>
-      </p:par>
-    </p:tnLst>
-  </p:timing>
 </p:sld>
 </file>
 
@@ -8130,7 +8371,7 @@
           <p:cNvPr id="2" name="Title 1">
             <a:extLst>
               <a:ext uri="{FF2B5EF4-FFF2-40B4-BE49-F238E27FC236}">
-                <a16:creationId xmlns:a16="http://schemas.microsoft.com/office/drawing/2014/main" xmlns="" id="{274240FC-3217-4B5E-BFDD-CD1CA1D50179}"/>
+                <a16:creationId xmlns:a16="http://schemas.microsoft.com/office/drawing/2014/main" id="{274240FC-3217-4B5E-BFDD-CD1CA1D50179}"/>
               </a:ext>
             </a:extLst>
           </p:cNvPr>
@@ -8159,7 +8400,7 @@
           <p:cNvPr id="3" name="Content Placeholder 2">
             <a:extLst>
               <a:ext uri="{FF2B5EF4-FFF2-40B4-BE49-F238E27FC236}">
-                <a16:creationId xmlns:a16="http://schemas.microsoft.com/office/drawing/2014/main" xmlns="" id="{EF208AB4-5010-4481-AD1E-82F52C1EFE47}"/>
+                <a16:creationId xmlns:a16="http://schemas.microsoft.com/office/drawing/2014/main" id="{EF208AB4-5010-4481-AD1E-82F52C1EFE47}"/>
               </a:ext>
             </a:extLst>
           </p:cNvPr>
@@ -8177,19 +8418,11 @@
           <a:p>
             <a:r>
               <a:rPr lang="en-US" dirty="0" err="1"/>
-              <a:t>r</a:t>
-            </a:r>
-            <a:r>
-              <a:rPr lang="en-US" dirty="0" err="1" smtClean="0"/>
-              <a:t>markdown</a:t>
-            </a:r>
-            <a:r>
-              <a:rPr lang="en-US" dirty="0" smtClean="0"/>
-              <a:t> </a:t>
+              <a:t>rmarkdown</a:t>
             </a:r>
             <a:r>
               <a:rPr lang="en-US" dirty="0"/>
-              <a:t>uses markdown language to generate its reports. It also supports a variety of other languages for data generation, manipulation, and </a:t>
+              <a:t> uses markdown language to generate its reports. It also supports a variety of other languages for data generation, manipulation, and </a:t>
             </a:r>
             <a:r>
               <a:rPr lang="en-US" dirty="0" err="1"/>
@@ -8203,19 +8436,11 @@
           <a:p>
             <a:r>
               <a:rPr lang="en-GB" dirty="0" err="1"/>
-              <a:t>r</a:t>
-            </a:r>
-            <a:r>
-              <a:rPr lang="en-GB" dirty="0" err="1" smtClean="0"/>
-              <a:t>markdown</a:t>
-            </a:r>
-            <a:r>
-              <a:rPr lang="en-GB" dirty="0" smtClean="0"/>
-              <a:t> </a:t>
+              <a:t>rmarkdown</a:t>
             </a:r>
             <a:r>
               <a:rPr lang="en-GB" dirty="0"/>
-              <a:t>essentially works in three main parts which we’ll look at shortly:</a:t>
+              <a:t> essentially works in three main parts which we’ll look at shortly:</a:t>
             </a:r>
           </a:p>
           <a:p>
@@ -8251,13 +8476,6 @@
   <p:clrMapOvr>
     <a:masterClrMapping/>
   </p:clrMapOvr>
-  <p:timing>
-    <p:tnLst>
-      <p:par>
-        <p:cTn id="1" dur="indefinite" restart="never" nodeType="tmRoot"/>
-      </p:par>
-    </p:tnLst>
-  </p:timing>
 </p:sld>
 </file>
 
@@ -8283,7 +8501,7 @@
           <p:cNvPr id="2" name="Title 1">
             <a:extLst>
               <a:ext uri="{FF2B5EF4-FFF2-40B4-BE49-F238E27FC236}">
-                <a16:creationId xmlns:a16="http://schemas.microsoft.com/office/drawing/2014/main" xmlns="" id="{478A1734-157B-4519-8667-19551B51AC3D}"/>
+                <a16:creationId xmlns:a16="http://schemas.microsoft.com/office/drawing/2014/main" id="{478A1734-157B-4519-8667-19551B51AC3D}"/>
               </a:ext>
             </a:extLst>
           </p:cNvPr>
@@ -8312,7 +8530,7 @@
           <p:cNvPr id="3" name="Content Placeholder 2">
             <a:extLst>
               <a:ext uri="{FF2B5EF4-FFF2-40B4-BE49-F238E27FC236}">
-                <a16:creationId xmlns:a16="http://schemas.microsoft.com/office/drawing/2014/main" xmlns="" id="{B084246B-946B-4B51-B396-6042858FFB83}"/>
+                <a16:creationId xmlns:a16="http://schemas.microsoft.com/office/drawing/2014/main" id="{B084246B-946B-4B51-B396-6042858FFB83}"/>
               </a:ext>
             </a:extLst>
           </p:cNvPr>
@@ -8389,13 +8607,6 @@
   <p:clrMapOvr>
     <a:masterClrMapping/>
   </p:clrMapOvr>
-  <p:timing>
-    <p:tnLst>
-      <p:par>
-        <p:cTn id="1" dur="indefinite" restart="never" nodeType="tmRoot"/>
-      </p:par>
-    </p:tnLst>
-  </p:timing>
 </p:sld>
 </file>
 

</xml_diff>